<commit_message>
le ppt avance !
</commit_message>
<xml_diff>
--- a/Analyse spectrale_etienne.pptx
+++ b/Analyse spectrale_etienne.pptx
@@ -5,10 +5,10 @@
     <p:sldMasterId id="2147483648" r:id="rId2"/>
   </p:sldMasterIdLst>
   <p:notesMasterIdLst>
-    <p:notesMasterId r:id="rId25"/>
+    <p:notesMasterId r:id="rId26"/>
   </p:notesMasterIdLst>
   <p:handoutMasterIdLst>
-    <p:handoutMasterId r:id="rId26"/>
+    <p:handoutMasterId r:id="rId27"/>
   </p:handoutMasterIdLst>
   <p:sldIdLst>
     <p:sldId id="256" r:id="rId3"/>
@@ -23,16 +23,17 @@
     <p:sldId id="276" r:id="rId12"/>
     <p:sldId id="277" r:id="rId13"/>
     <p:sldId id="278" r:id="rId14"/>
-    <p:sldId id="273" r:id="rId15"/>
-    <p:sldId id="258" r:id="rId16"/>
-    <p:sldId id="260" r:id="rId17"/>
-    <p:sldId id="259" r:id="rId18"/>
-    <p:sldId id="261" r:id="rId19"/>
-    <p:sldId id="262" r:id="rId20"/>
-    <p:sldId id="263" r:id="rId21"/>
-    <p:sldId id="264" r:id="rId22"/>
-    <p:sldId id="265" r:id="rId23"/>
-    <p:sldId id="266" r:id="rId24"/>
+    <p:sldId id="279" r:id="rId15"/>
+    <p:sldId id="273" r:id="rId16"/>
+    <p:sldId id="258" r:id="rId17"/>
+    <p:sldId id="260" r:id="rId18"/>
+    <p:sldId id="259" r:id="rId19"/>
+    <p:sldId id="261" r:id="rId20"/>
+    <p:sldId id="262" r:id="rId21"/>
+    <p:sldId id="263" r:id="rId22"/>
+    <p:sldId id="264" r:id="rId23"/>
+    <p:sldId id="265" r:id="rId24"/>
+    <p:sldId id="266" r:id="rId25"/>
   </p:sldIdLst>
   <p:sldSz cx="12192000" cy="6858000"/>
   <p:notesSz cx="6858000" cy="9144000"/>
@@ -2335,28 +2336,28 @@
     </dgm:pt>
   </dgm:ptLst>
   <dgm:cxnLst>
-    <dgm:cxn modelId="{0DE776BA-5D89-4AF6-AD34-83FB1B440D6E}" type="presOf" srcId="{C3DC95A2-4D92-42C5-966E-8600E4BA31BD}" destId="{B752F9F5-2482-4D52-A33E-BE0263F4B0EA}" srcOrd="1" destOrd="0" presId="urn:microsoft.com/office/officeart/2005/8/layout/process4"/>
+    <dgm:cxn modelId="{5A012591-AD10-4CB9-87CA-80F836A87F10}" type="presOf" srcId="{B5387FF0-0982-441E-9F8E-19335142671C}" destId="{0F0AC827-ACAE-4C23-875D-A4B53006A73F}" srcOrd="0" destOrd="0" presId="urn:microsoft.com/office/officeart/2005/8/layout/process4"/>
+    <dgm:cxn modelId="{7888DF58-4351-4017-97B5-9A2C1542304F}" type="presOf" srcId="{17ACD041-408C-4E7D-B463-7267D32756A1}" destId="{C4F2ADBF-C592-483D-A6FF-5DB9D2A90309}" srcOrd="0" destOrd="0" presId="urn:microsoft.com/office/officeart/2005/8/layout/process4"/>
+    <dgm:cxn modelId="{38C6CA17-AB89-46B1-B380-B602383053FA}" type="presOf" srcId="{DB6AA457-F75F-415D-BDD5-92045774FE4B}" destId="{7371425A-4D37-4FA7-A21E-1529F4324E45}" srcOrd="0" destOrd="0" presId="urn:microsoft.com/office/officeart/2005/8/layout/process4"/>
+    <dgm:cxn modelId="{9653D664-EC18-40D7-9F5E-3B27A70DCA4D}" srcId="{CD5204CD-6958-4A55-82AA-4AD73B3B6A19}" destId="{C712D637-7FF1-401C-9304-F85D1B95B226}" srcOrd="0" destOrd="0" parTransId="{05E1DD5C-7FEF-48F0-9651-C74D082ACBA9}" sibTransId="{F14B97BF-E90F-4D5A-A42B-6364BCB81249}"/>
+    <dgm:cxn modelId="{51AAE964-0278-4D77-A962-9CAED2A33AFC}" type="presOf" srcId="{DB6AA457-F75F-415D-BDD5-92045774FE4B}" destId="{80AD606B-F25E-46DF-B405-18F7D2EAE74A}" srcOrd="1" destOrd="0" presId="urn:microsoft.com/office/officeart/2005/8/layout/process4"/>
+    <dgm:cxn modelId="{88A87FA6-C1EB-4109-9B9E-2FE10DE80F14}" srcId="{C712D637-7FF1-401C-9304-F85D1B95B226}" destId="{DA33CDF4-5B94-4B92-9E0A-4DFD4CBFAF2D}" srcOrd="1" destOrd="0" parTransId="{B7ECB8E0-4CD3-4804-BE8C-5260A5083C57}" sibTransId="{D3EF4DE2-351E-4A5C-980A-1BBDC899AAC2}"/>
+    <dgm:cxn modelId="{8A476EEB-6A39-4004-AD8C-BD56913E7B26}" srcId="{CD5204CD-6958-4A55-82AA-4AD73B3B6A19}" destId="{C3DC95A2-4D92-42C5-966E-8600E4BA31BD}" srcOrd="2" destOrd="0" parTransId="{F9D94033-59E5-4228-A5F3-6CB272E77E3B}" sibTransId="{A43E3114-C8AC-4F44-952D-8A0D6A8A6B45}"/>
+    <dgm:cxn modelId="{654ADFCB-9F48-4311-9D35-6D66E259C0F0}" type="presOf" srcId="{DA33CDF4-5B94-4B92-9E0A-4DFD4CBFAF2D}" destId="{3EC7D028-ECEA-492B-A6F1-68E9B57B69C6}" srcOrd="0" destOrd="0" presId="urn:microsoft.com/office/officeart/2005/8/layout/process4"/>
+    <dgm:cxn modelId="{93F76B4F-907D-4630-B1A9-C3BE3C102DFF}" srcId="{CD5204CD-6958-4A55-82AA-4AD73B3B6A19}" destId="{DB6AA457-F75F-415D-BDD5-92045774FE4B}" srcOrd="1" destOrd="0" parTransId="{195DBB62-3C1E-4BED-ADB6-6E31CA6ABD63}" sibTransId="{C684833D-85CC-4010-A138-ABC65E139C69}"/>
+    <dgm:cxn modelId="{9CD14EFA-0F76-4A1F-B614-3498F606687F}" type="presOf" srcId="{3FE03ED9-3066-4E28-8291-0B1764DC85D6}" destId="{A6EE397C-6C28-4128-BFFE-CFF44F70153F}" srcOrd="0" destOrd="0" presId="urn:microsoft.com/office/officeart/2005/8/layout/process4"/>
     <dgm:cxn modelId="{49DFB11E-EAA1-4720-837C-5291C468F94A}" type="presOf" srcId="{C712D637-7FF1-401C-9304-F85D1B95B226}" destId="{A48265CE-F3A3-46DB-9DD2-97590B4DBB84}" srcOrd="1" destOrd="0" presId="urn:microsoft.com/office/officeart/2005/8/layout/process4"/>
+    <dgm:cxn modelId="{CE503079-5EBC-46C6-AEA7-05CAA4676BB5}" type="presOf" srcId="{743FE7B1-011B-42E6-8768-1EB3E95741FA}" destId="{59FFE57C-E5F2-4FBD-AA4D-8DB27381892F}" srcOrd="0" destOrd="0" presId="urn:microsoft.com/office/officeart/2005/8/layout/process4"/>
+    <dgm:cxn modelId="{F9232B4D-645E-4C93-A5D6-A89B30504327}" srcId="{DB6AA457-F75F-415D-BDD5-92045774FE4B}" destId="{99C943DF-AAA4-4E2C-A283-FA2BF761F447}" srcOrd="0" destOrd="0" parTransId="{20F107AF-35DA-4D25-AB35-B8AD821D3FE7}" sibTransId="{4802CB64-7B32-458C-A9FF-C35C0A51E69A}"/>
+    <dgm:cxn modelId="{7AC8567A-4A9D-4A2D-9B97-5F366E5A9589}" type="presOf" srcId="{C3DC95A2-4D92-42C5-966E-8600E4BA31BD}" destId="{588D9B7D-EC68-4FB0-96F2-2E47AC868059}" srcOrd="0" destOrd="0" presId="urn:microsoft.com/office/officeart/2005/8/layout/process4"/>
     <dgm:cxn modelId="{EF7A2011-FCAC-41A8-A305-634BF780B59D}" srcId="{DB6AA457-F75F-415D-BDD5-92045774FE4B}" destId="{3FE03ED9-3066-4E28-8291-0B1764DC85D6}" srcOrd="1" destOrd="0" parTransId="{70F79093-990B-4C69-A0BC-6E28D692D24F}" sibTransId="{2D17DCF5-1F10-4F99-AFA5-9D17F12D0A73}"/>
-    <dgm:cxn modelId="{F9232B4D-645E-4C93-A5D6-A89B30504327}" srcId="{DB6AA457-F75F-415D-BDD5-92045774FE4B}" destId="{99C943DF-AAA4-4E2C-A283-FA2BF761F447}" srcOrd="0" destOrd="0" parTransId="{20F107AF-35DA-4D25-AB35-B8AD821D3FE7}" sibTransId="{4802CB64-7B32-458C-A9FF-C35C0A51E69A}"/>
-    <dgm:cxn modelId="{CE503079-5EBC-46C6-AEA7-05CAA4676BB5}" type="presOf" srcId="{743FE7B1-011B-42E6-8768-1EB3E95741FA}" destId="{59FFE57C-E5F2-4FBD-AA4D-8DB27381892F}" srcOrd="0" destOrd="0" presId="urn:microsoft.com/office/officeart/2005/8/layout/process4"/>
-    <dgm:cxn modelId="{7574A873-09B6-4955-9A03-A5E1A1036E6A}" type="presOf" srcId="{C712D637-7FF1-401C-9304-F85D1B95B226}" destId="{859CA2CA-8A33-4975-9F01-7A3C8BB729DE}" srcOrd="0" destOrd="0" presId="urn:microsoft.com/office/officeart/2005/8/layout/process4"/>
-    <dgm:cxn modelId="{88A87FA6-C1EB-4109-9B9E-2FE10DE80F14}" srcId="{C712D637-7FF1-401C-9304-F85D1B95B226}" destId="{DA33CDF4-5B94-4B92-9E0A-4DFD4CBFAF2D}" srcOrd="1" destOrd="0" parTransId="{B7ECB8E0-4CD3-4804-BE8C-5260A5083C57}" sibTransId="{D3EF4DE2-351E-4A5C-980A-1BBDC899AAC2}"/>
-    <dgm:cxn modelId="{6FF8166B-A137-45DB-919B-F84C9A9DEC94}" type="presOf" srcId="{CD5204CD-6958-4A55-82AA-4AD73B3B6A19}" destId="{31D3AE5D-DA06-4E2D-9D68-F5531DFE7C2B}" srcOrd="0" destOrd="0" presId="urn:microsoft.com/office/officeart/2005/8/layout/process4"/>
-    <dgm:cxn modelId="{9CD14EFA-0F76-4A1F-B614-3498F606687F}" type="presOf" srcId="{3FE03ED9-3066-4E28-8291-0B1764DC85D6}" destId="{A6EE397C-6C28-4128-BFFE-CFF44F70153F}" srcOrd="0" destOrd="0" presId="urn:microsoft.com/office/officeart/2005/8/layout/process4"/>
-    <dgm:cxn modelId="{5A012591-AD10-4CB9-87CA-80F836A87F10}" type="presOf" srcId="{B5387FF0-0982-441E-9F8E-19335142671C}" destId="{0F0AC827-ACAE-4C23-875D-A4B53006A73F}" srcOrd="0" destOrd="0" presId="urn:microsoft.com/office/officeart/2005/8/layout/process4"/>
-    <dgm:cxn modelId="{93F76B4F-907D-4630-B1A9-C3BE3C102DFF}" srcId="{CD5204CD-6958-4A55-82AA-4AD73B3B6A19}" destId="{DB6AA457-F75F-415D-BDD5-92045774FE4B}" srcOrd="1" destOrd="0" parTransId="{195DBB62-3C1E-4BED-ADB6-6E31CA6ABD63}" sibTransId="{C684833D-85CC-4010-A138-ABC65E139C69}"/>
-    <dgm:cxn modelId="{8A476EEB-6A39-4004-AD8C-BD56913E7B26}" srcId="{CD5204CD-6958-4A55-82AA-4AD73B3B6A19}" destId="{C3DC95A2-4D92-42C5-966E-8600E4BA31BD}" srcOrd="2" destOrd="0" parTransId="{F9D94033-59E5-4228-A5F3-6CB272E77E3B}" sibTransId="{A43E3114-C8AC-4F44-952D-8A0D6A8A6B45}"/>
-    <dgm:cxn modelId="{9653D664-EC18-40D7-9F5E-3B27A70DCA4D}" srcId="{CD5204CD-6958-4A55-82AA-4AD73B3B6A19}" destId="{C712D637-7FF1-401C-9304-F85D1B95B226}" srcOrd="0" destOrd="0" parTransId="{05E1DD5C-7FEF-48F0-9651-C74D082ACBA9}" sibTransId="{F14B97BF-E90F-4D5A-A42B-6364BCB81249}"/>
-    <dgm:cxn modelId="{654ADFCB-9F48-4311-9D35-6D66E259C0F0}" type="presOf" srcId="{DA33CDF4-5B94-4B92-9E0A-4DFD4CBFAF2D}" destId="{3EC7D028-ECEA-492B-A6F1-68E9B57B69C6}" srcOrd="0" destOrd="0" presId="urn:microsoft.com/office/officeart/2005/8/layout/process4"/>
-    <dgm:cxn modelId="{7AC8567A-4A9D-4A2D-9B97-5F366E5A9589}" type="presOf" srcId="{C3DC95A2-4D92-42C5-966E-8600E4BA31BD}" destId="{588D9B7D-EC68-4FB0-96F2-2E47AC868059}" srcOrd="0" destOrd="0" presId="urn:microsoft.com/office/officeart/2005/8/layout/process4"/>
-    <dgm:cxn modelId="{7F70C7BE-72E8-441E-B7CF-522ADEA91ECB}" srcId="{C3DC95A2-4D92-42C5-966E-8600E4BA31BD}" destId="{B5387FF0-0982-441E-9F8E-19335142671C}" srcOrd="1" destOrd="0" parTransId="{FE9534D2-E5E4-4494-A37E-5724362DB3AC}" sibTransId="{0DB486FB-DB2E-4894-89D1-AA4679580390}"/>
+    <dgm:cxn modelId="{6D29C741-1B1E-4EBC-A0C7-F287A8ED285A}" srcId="{C712D637-7FF1-401C-9304-F85D1B95B226}" destId="{743FE7B1-011B-42E6-8768-1EB3E95741FA}" srcOrd="0" destOrd="0" parTransId="{921AFB12-2D70-40FB-8AB1-299E0FF2C5A6}" sibTransId="{FFAF77DD-A644-4C36-8908-6204BB0D9268}"/>
     <dgm:cxn modelId="{A9D8FDD5-46C6-47E0-AA21-CE5D26EBFF1C}" type="presOf" srcId="{99C943DF-AAA4-4E2C-A283-FA2BF761F447}" destId="{A8E0F749-66B2-490B-99E9-CC106B163B16}" srcOrd="0" destOrd="0" presId="urn:microsoft.com/office/officeart/2005/8/layout/process4"/>
     <dgm:cxn modelId="{EBCDDEFB-4955-4864-90AB-7D693BE5DA0A}" srcId="{C3DC95A2-4D92-42C5-966E-8600E4BA31BD}" destId="{17ACD041-408C-4E7D-B463-7267D32756A1}" srcOrd="0" destOrd="0" parTransId="{209FC651-3F8E-4BF8-8C06-328027667041}" sibTransId="{A6AA8096-532A-4378-9BB6-B585B46357E5}"/>
-    <dgm:cxn modelId="{6D29C741-1B1E-4EBC-A0C7-F287A8ED285A}" srcId="{C712D637-7FF1-401C-9304-F85D1B95B226}" destId="{743FE7B1-011B-42E6-8768-1EB3E95741FA}" srcOrd="0" destOrd="0" parTransId="{921AFB12-2D70-40FB-8AB1-299E0FF2C5A6}" sibTransId="{FFAF77DD-A644-4C36-8908-6204BB0D9268}"/>
-    <dgm:cxn modelId="{38C6CA17-AB89-46B1-B380-B602383053FA}" type="presOf" srcId="{DB6AA457-F75F-415D-BDD5-92045774FE4B}" destId="{7371425A-4D37-4FA7-A21E-1529F4324E45}" srcOrd="0" destOrd="0" presId="urn:microsoft.com/office/officeart/2005/8/layout/process4"/>
-    <dgm:cxn modelId="{51AAE964-0278-4D77-A962-9CAED2A33AFC}" type="presOf" srcId="{DB6AA457-F75F-415D-BDD5-92045774FE4B}" destId="{80AD606B-F25E-46DF-B405-18F7D2EAE74A}" srcOrd="1" destOrd="0" presId="urn:microsoft.com/office/officeart/2005/8/layout/process4"/>
-    <dgm:cxn modelId="{7888DF58-4351-4017-97B5-9A2C1542304F}" type="presOf" srcId="{17ACD041-408C-4E7D-B463-7267D32756A1}" destId="{C4F2ADBF-C592-483D-A6FF-5DB9D2A90309}" srcOrd="0" destOrd="0" presId="urn:microsoft.com/office/officeart/2005/8/layout/process4"/>
+    <dgm:cxn modelId="{6FF8166B-A137-45DB-919B-F84C9A9DEC94}" type="presOf" srcId="{CD5204CD-6958-4A55-82AA-4AD73B3B6A19}" destId="{31D3AE5D-DA06-4E2D-9D68-F5531DFE7C2B}" srcOrd="0" destOrd="0" presId="urn:microsoft.com/office/officeart/2005/8/layout/process4"/>
+    <dgm:cxn modelId="{7574A873-09B6-4955-9A03-A5E1A1036E6A}" type="presOf" srcId="{C712D637-7FF1-401C-9304-F85D1B95B226}" destId="{859CA2CA-8A33-4975-9F01-7A3C8BB729DE}" srcOrd="0" destOrd="0" presId="urn:microsoft.com/office/officeart/2005/8/layout/process4"/>
+    <dgm:cxn modelId="{0DE776BA-5D89-4AF6-AD34-83FB1B440D6E}" type="presOf" srcId="{C3DC95A2-4D92-42C5-966E-8600E4BA31BD}" destId="{B752F9F5-2482-4D52-A33E-BE0263F4B0EA}" srcOrd="1" destOrd="0" presId="urn:microsoft.com/office/officeart/2005/8/layout/process4"/>
+    <dgm:cxn modelId="{7F70C7BE-72E8-441E-B7CF-522ADEA91ECB}" srcId="{C3DC95A2-4D92-42C5-966E-8600E4BA31BD}" destId="{B5387FF0-0982-441E-9F8E-19335142671C}" srcOrd="1" destOrd="0" parTransId="{FE9534D2-E5E4-4494-A37E-5724362DB3AC}" sibTransId="{0DB486FB-DB2E-4894-89D1-AA4679580390}"/>
     <dgm:cxn modelId="{7D643549-6AEE-4E26-BA58-D9C18C7ABAF4}" type="presParOf" srcId="{31D3AE5D-DA06-4E2D-9D68-F5531DFE7C2B}" destId="{127AFF01-F37D-42CC-8885-1689151201CD}" srcOrd="0" destOrd="0" presId="urn:microsoft.com/office/officeart/2005/8/layout/process4"/>
     <dgm:cxn modelId="{98720DA4-094D-4E12-A052-17C1E4A351C5}" type="presParOf" srcId="{127AFF01-F37D-42CC-8885-1689151201CD}" destId="{588D9B7D-EC68-4FB0-96F2-2E47AC868059}" srcOrd="0" destOrd="0" presId="urn:microsoft.com/office/officeart/2005/8/layout/process4"/>
     <dgm:cxn modelId="{DBDEF9E6-6D83-4091-9045-E138E6FA8DD2}" type="presParOf" srcId="{127AFF01-F37D-42CC-8885-1689151201CD}" destId="{B752F9F5-2482-4D52-A33E-BE0263F4B0EA}" srcOrd="1" destOrd="0" presId="urn:microsoft.com/office/officeart/2005/8/layout/process4"/>
@@ -3078,6 +3079,777 @@
       <dsp:cNvGrpSpPr/>
     </dsp:nvGrpSpPr>
     <dsp:grpSpPr/>
+    <dsp:sp modelId="{B752F9F5-2482-4D52-A33E-BE0263F4B0EA}">
+      <dsp:nvSpPr>
+        <dsp:cNvPr id="0" name=""/>
+        <dsp:cNvSpPr/>
+      </dsp:nvSpPr>
+      <dsp:spPr>
+        <a:xfrm>
+          <a:off x="0" y="3443976"/>
+          <a:ext cx="5334000" cy="1130389"/>
+        </a:xfrm>
+        <a:prstGeom prst="rect">
+          <a:avLst/>
+        </a:prstGeom>
+        <a:solidFill>
+          <a:schemeClr val="accent3">
+            <a:hueOff val="0"/>
+            <a:satOff val="0"/>
+            <a:lumOff val="0"/>
+            <a:alphaOff val="0"/>
+          </a:schemeClr>
+        </a:solidFill>
+        <a:ln w="12700" cap="flat" cmpd="sng" algn="ctr">
+          <a:solidFill>
+            <a:schemeClr val="lt1">
+              <a:hueOff val="0"/>
+              <a:satOff val="0"/>
+              <a:lumOff val="0"/>
+              <a:alphaOff val="0"/>
+            </a:schemeClr>
+          </a:solidFill>
+          <a:prstDash val="solid"/>
+          <a:miter lim="800000"/>
+        </a:ln>
+        <a:effectLst/>
+      </dsp:spPr>
+      <dsp:style>
+        <a:lnRef idx="2">
+          <a:scrgbClr r="0" g="0" b="0"/>
+        </a:lnRef>
+        <a:fillRef idx="1">
+          <a:scrgbClr r="0" g="0" b="0"/>
+        </a:fillRef>
+        <a:effectRef idx="0">
+          <a:scrgbClr r="0" g="0" b="0"/>
+        </a:effectRef>
+        <a:fontRef idx="minor">
+          <a:schemeClr val="lt1"/>
+        </a:fontRef>
+      </dsp:style>
+      <dsp:txBody>
+        <a:bodyPr spcFirstLastPara="0" vert="horz" wrap="square" lIns="156464" tIns="156464" rIns="156464" bIns="156464" numCol="1" spcCol="1270" anchor="ctr" anchorCtr="0">
+          <a:noAutofit/>
+        </a:bodyPr>
+        <a:lstStyle/>
+        <a:p>
+          <a:pPr lvl="0" algn="ctr" defTabSz="914400">
+            <a:lnSpc>
+              <a:spcPct val="90000"/>
+            </a:lnSpc>
+            <a:spcBef>
+              <a:spcPct val="0"/>
+            </a:spcBef>
+            <a:spcAft>
+              <a:spcPct val="35000"/>
+            </a:spcAft>
+            <a:buNone/>
+          </a:pPr>
+          <a:r>
+            <a:rPr lang="fr-FR" sz="2200" i="1" kern="1200" noProof="0" dirty="0" smtClean="0"/>
+            <a:t>Pour aller plus loin</a:t>
+          </a:r>
+          <a:endParaRPr lang="fr-FR" sz="2200" i="1" kern="1200" noProof="0" dirty="0"/>
+        </a:p>
+      </dsp:txBody>
+      <dsp:txXfrm>
+        <a:off x="0" y="3443976"/>
+        <a:ext cx="5334000" cy="610410"/>
+      </dsp:txXfrm>
+    </dsp:sp>
+    <dsp:sp modelId="{C4F2ADBF-C592-483D-A6FF-5DB9D2A90309}">
+      <dsp:nvSpPr>
+        <dsp:cNvPr id="0" name=""/>
+        <dsp:cNvSpPr/>
+      </dsp:nvSpPr>
+      <dsp:spPr>
+        <a:xfrm>
+          <a:off x="0" y="4031779"/>
+          <a:ext cx="2667000" cy="519979"/>
+        </a:xfrm>
+        <a:prstGeom prst="rect">
+          <a:avLst/>
+        </a:prstGeom>
+        <a:solidFill>
+          <a:schemeClr val="accent3">
+            <a:tint val="40000"/>
+            <a:alpha val="90000"/>
+            <a:hueOff val="0"/>
+            <a:satOff val="0"/>
+            <a:lumOff val="0"/>
+            <a:alphaOff val="0"/>
+          </a:schemeClr>
+        </a:solidFill>
+        <a:ln w="12700" cap="flat" cmpd="sng" algn="ctr">
+          <a:solidFill>
+            <a:schemeClr val="accent3">
+              <a:tint val="40000"/>
+              <a:alpha val="90000"/>
+              <a:hueOff val="0"/>
+              <a:satOff val="0"/>
+              <a:lumOff val="0"/>
+              <a:alphaOff val="0"/>
+            </a:schemeClr>
+          </a:solidFill>
+          <a:prstDash val="solid"/>
+          <a:miter lim="800000"/>
+        </a:ln>
+        <a:effectLst/>
+      </dsp:spPr>
+      <dsp:style>
+        <a:lnRef idx="2">
+          <a:scrgbClr r="0" g="0" b="0"/>
+        </a:lnRef>
+        <a:fillRef idx="1">
+          <a:scrgbClr r="0" g="0" b="0"/>
+        </a:fillRef>
+        <a:effectRef idx="0">
+          <a:scrgbClr r="0" g="0" b="0"/>
+        </a:effectRef>
+        <a:fontRef idx="minor"/>
+      </dsp:style>
+      <dsp:txBody>
+        <a:bodyPr spcFirstLastPara="0" vert="horz" wrap="square" lIns="156464" tIns="27940" rIns="156464" bIns="27940" numCol="1" spcCol="1270" anchor="ctr" anchorCtr="0">
+          <a:noAutofit/>
+        </a:bodyPr>
+        <a:lstStyle/>
+        <a:p>
+          <a:pPr lvl="0" algn="l" defTabSz="914400">
+            <a:lnSpc>
+              <a:spcPct val="90000"/>
+            </a:lnSpc>
+            <a:spcBef>
+              <a:spcPct val="0"/>
+            </a:spcBef>
+            <a:spcAft>
+              <a:spcPct val="35000"/>
+            </a:spcAft>
+            <a:buNone/>
+          </a:pPr>
+          <a:r>
+            <a:rPr lang="fr-FR" sz="2200" b="0" i="0" kern="1200" noProof="0" dirty="0" smtClean="0">
+              <a:latin typeface="Franklin Gothic Medium"/>
+              <a:ea typeface="+mn-ea"/>
+              <a:cs typeface="+mn-cs"/>
+            </a:rPr>
+            <a:t>Reconstitution</a:t>
+          </a:r>
+          <a:endParaRPr lang="fr-FR" sz="2200" b="0" i="0" kern="1200" noProof="0" dirty="0">
+            <a:latin typeface="Franklin Gothic Medium"/>
+            <a:ea typeface="+mn-ea"/>
+            <a:cs typeface="+mn-cs"/>
+          </a:endParaRPr>
+        </a:p>
+      </dsp:txBody>
+      <dsp:txXfrm>
+        <a:off x="0" y="4031779"/>
+        <a:ext cx="2667000" cy="519979"/>
+      </dsp:txXfrm>
+    </dsp:sp>
+    <dsp:sp modelId="{0F0AC827-ACAE-4C23-875D-A4B53006A73F}">
+      <dsp:nvSpPr>
+        <dsp:cNvPr id="0" name=""/>
+        <dsp:cNvSpPr/>
+      </dsp:nvSpPr>
+      <dsp:spPr>
+        <a:xfrm>
+          <a:off x="2667000" y="4031779"/>
+          <a:ext cx="2667000" cy="519979"/>
+        </a:xfrm>
+        <a:prstGeom prst="rect">
+          <a:avLst/>
+        </a:prstGeom>
+        <a:solidFill>
+          <a:schemeClr val="accent3">
+            <a:tint val="40000"/>
+            <a:alpha val="90000"/>
+            <a:hueOff val="405828"/>
+            <a:satOff val="20000"/>
+            <a:lumOff val="356"/>
+            <a:alphaOff val="0"/>
+          </a:schemeClr>
+        </a:solidFill>
+        <a:ln w="12700" cap="flat" cmpd="sng" algn="ctr">
+          <a:solidFill>
+            <a:schemeClr val="accent3">
+              <a:tint val="40000"/>
+              <a:alpha val="90000"/>
+              <a:hueOff val="405828"/>
+              <a:satOff val="20000"/>
+              <a:lumOff val="356"/>
+              <a:alphaOff val="0"/>
+            </a:schemeClr>
+          </a:solidFill>
+          <a:prstDash val="solid"/>
+          <a:miter lim="800000"/>
+        </a:ln>
+        <a:effectLst/>
+      </dsp:spPr>
+      <dsp:style>
+        <a:lnRef idx="2">
+          <a:scrgbClr r="0" g="0" b="0"/>
+        </a:lnRef>
+        <a:fillRef idx="1">
+          <a:scrgbClr r="0" g="0" b="0"/>
+        </a:fillRef>
+        <a:effectRef idx="0">
+          <a:scrgbClr r="0" g="0" b="0"/>
+        </a:effectRef>
+        <a:fontRef idx="minor"/>
+      </dsp:style>
+      <dsp:txBody>
+        <a:bodyPr spcFirstLastPara="0" vert="horz" wrap="square" lIns="156464" tIns="27940" rIns="156464" bIns="27940" numCol="1" spcCol="1270" anchor="ctr" anchorCtr="0">
+          <a:noAutofit/>
+        </a:bodyPr>
+        <a:lstStyle/>
+        <a:p>
+          <a:pPr lvl="0" algn="l" defTabSz="914400">
+            <a:lnSpc>
+              <a:spcPct val="90000"/>
+            </a:lnSpc>
+            <a:spcBef>
+              <a:spcPct val="0"/>
+            </a:spcBef>
+            <a:spcAft>
+              <a:spcPct val="35000"/>
+            </a:spcAft>
+            <a:buNone/>
+          </a:pPr>
+          <a:r>
+            <a:rPr lang="fr-FR" sz="2200" b="0" i="0" kern="1200" noProof="0" dirty="0" smtClean="0">
+              <a:latin typeface="Franklin Gothic Medium"/>
+              <a:ea typeface="+mn-ea"/>
+              <a:cs typeface="+mn-cs"/>
+            </a:rPr>
+            <a:t>…</a:t>
+          </a:r>
+          <a:endParaRPr lang="fr-FR" sz="2200" b="0" i="0" kern="1200" noProof="0" dirty="0">
+            <a:latin typeface="Franklin Gothic Medium"/>
+            <a:ea typeface="+mn-ea"/>
+            <a:cs typeface="+mn-cs"/>
+          </a:endParaRPr>
+        </a:p>
+      </dsp:txBody>
+      <dsp:txXfrm>
+        <a:off x="2667000" y="4031779"/>
+        <a:ext cx="2667000" cy="519979"/>
+      </dsp:txXfrm>
+    </dsp:sp>
+    <dsp:sp modelId="{80AD606B-F25E-46DF-B405-18F7D2EAE74A}">
+      <dsp:nvSpPr>
+        <dsp:cNvPr id="0" name=""/>
+        <dsp:cNvSpPr/>
+      </dsp:nvSpPr>
+      <dsp:spPr>
+        <a:xfrm rot="10800000">
+          <a:off x="0" y="1722392"/>
+          <a:ext cx="5334000" cy="1738539"/>
+        </a:xfrm>
+        <a:prstGeom prst="upArrowCallout">
+          <a:avLst/>
+        </a:prstGeom>
+        <a:solidFill>
+          <a:schemeClr val="accent3">
+            <a:hueOff val="1355300"/>
+            <a:satOff val="50000"/>
+            <a:lumOff val="-7353"/>
+            <a:alphaOff val="0"/>
+          </a:schemeClr>
+        </a:solidFill>
+        <a:ln w="12700" cap="flat" cmpd="sng" algn="ctr">
+          <a:solidFill>
+            <a:schemeClr val="lt1">
+              <a:hueOff val="0"/>
+              <a:satOff val="0"/>
+              <a:lumOff val="0"/>
+              <a:alphaOff val="0"/>
+            </a:schemeClr>
+          </a:solidFill>
+          <a:prstDash val="solid"/>
+          <a:miter lim="800000"/>
+        </a:ln>
+        <a:effectLst/>
+      </dsp:spPr>
+      <dsp:style>
+        <a:lnRef idx="2">
+          <a:scrgbClr r="0" g="0" b="0"/>
+        </a:lnRef>
+        <a:fillRef idx="1">
+          <a:scrgbClr r="0" g="0" b="0"/>
+        </a:fillRef>
+        <a:effectRef idx="0">
+          <a:scrgbClr r="0" g="0" b="0"/>
+        </a:effectRef>
+        <a:fontRef idx="minor">
+          <a:schemeClr val="lt1"/>
+        </a:fontRef>
+      </dsp:style>
+      <dsp:txBody>
+        <a:bodyPr spcFirstLastPara="0" vert="horz" wrap="square" lIns="156464" tIns="156464" rIns="156464" bIns="156464" numCol="1" spcCol="1270" anchor="ctr" anchorCtr="0">
+          <a:noAutofit/>
+        </a:bodyPr>
+        <a:lstStyle/>
+        <a:p>
+          <a:pPr lvl="0" algn="ctr" defTabSz="914400">
+            <a:lnSpc>
+              <a:spcPct val="90000"/>
+            </a:lnSpc>
+            <a:spcBef>
+              <a:spcPct val="0"/>
+            </a:spcBef>
+            <a:spcAft>
+              <a:spcPct val="35000"/>
+            </a:spcAft>
+            <a:buNone/>
+          </a:pPr>
+          <a:r>
+            <a:rPr lang="fr-FR" sz="2200" kern="1200" noProof="0" dirty="0" smtClean="0"/>
+            <a:t>Traitement</a:t>
+          </a:r>
+          <a:endParaRPr lang="fr-FR" sz="2200" kern="1200" noProof="0" dirty="0"/>
+        </a:p>
+      </dsp:txBody>
+      <dsp:txXfrm rot="-10800000">
+        <a:off x="0" y="1722392"/>
+        <a:ext cx="5334000" cy="610227"/>
+      </dsp:txXfrm>
+    </dsp:sp>
+    <dsp:sp modelId="{A8E0F749-66B2-490B-99E9-CC106B163B16}">
+      <dsp:nvSpPr>
+        <dsp:cNvPr id="0" name=""/>
+        <dsp:cNvSpPr/>
+      </dsp:nvSpPr>
+      <dsp:spPr>
+        <a:xfrm>
+          <a:off x="0" y="2332619"/>
+          <a:ext cx="2667000" cy="519823"/>
+        </a:xfrm>
+        <a:prstGeom prst="rect">
+          <a:avLst/>
+        </a:prstGeom>
+        <a:solidFill>
+          <a:schemeClr val="accent3">
+            <a:tint val="40000"/>
+            <a:alpha val="90000"/>
+            <a:hueOff val="811656"/>
+            <a:satOff val="40000"/>
+            <a:lumOff val="712"/>
+            <a:alphaOff val="0"/>
+          </a:schemeClr>
+        </a:solidFill>
+        <a:ln w="12700" cap="flat" cmpd="sng" algn="ctr">
+          <a:solidFill>
+            <a:schemeClr val="accent3">
+              <a:tint val="40000"/>
+              <a:alpha val="90000"/>
+              <a:hueOff val="811656"/>
+              <a:satOff val="40000"/>
+              <a:lumOff val="712"/>
+              <a:alphaOff val="0"/>
+            </a:schemeClr>
+          </a:solidFill>
+          <a:prstDash val="solid"/>
+          <a:miter lim="800000"/>
+        </a:ln>
+        <a:effectLst/>
+      </dsp:spPr>
+      <dsp:style>
+        <a:lnRef idx="2">
+          <a:scrgbClr r="0" g="0" b="0"/>
+        </a:lnRef>
+        <a:fillRef idx="1">
+          <a:scrgbClr r="0" g="0" b="0"/>
+        </a:fillRef>
+        <a:effectRef idx="0">
+          <a:scrgbClr r="0" g="0" b="0"/>
+        </a:effectRef>
+        <a:fontRef idx="minor"/>
+      </dsp:style>
+      <dsp:txBody>
+        <a:bodyPr spcFirstLastPara="0" vert="horz" wrap="square" lIns="156464" tIns="27940" rIns="156464" bIns="27940" numCol="1" spcCol="1270" anchor="ctr" anchorCtr="0">
+          <a:noAutofit/>
+        </a:bodyPr>
+        <a:lstStyle/>
+        <a:p>
+          <a:pPr lvl="0" algn="l" defTabSz="914400">
+            <a:lnSpc>
+              <a:spcPct val="90000"/>
+            </a:lnSpc>
+            <a:spcBef>
+              <a:spcPct val="0"/>
+            </a:spcBef>
+            <a:spcAft>
+              <a:spcPct val="35000"/>
+            </a:spcAft>
+            <a:buNone/>
+          </a:pPr>
+          <a:r>
+            <a:rPr lang="fr-FR" sz="2200" b="0" i="0" kern="1200" noProof="0" dirty="0" smtClean="0">
+              <a:latin typeface="Franklin Gothic Medium"/>
+              <a:ea typeface="+mn-ea"/>
+              <a:cs typeface="+mn-cs"/>
+            </a:rPr>
+            <a:t>Comparaison</a:t>
+          </a:r>
+          <a:endParaRPr lang="fr-FR" sz="2200" b="0" i="0" kern="1200" noProof="0" dirty="0">
+            <a:latin typeface="Franklin Gothic Medium"/>
+            <a:ea typeface="+mn-ea"/>
+            <a:cs typeface="+mn-cs"/>
+          </a:endParaRPr>
+        </a:p>
+      </dsp:txBody>
+      <dsp:txXfrm>
+        <a:off x="0" y="2332619"/>
+        <a:ext cx="2667000" cy="519823"/>
+      </dsp:txXfrm>
+    </dsp:sp>
+    <dsp:sp modelId="{A6EE397C-6C28-4128-BFFE-CFF44F70153F}">
+      <dsp:nvSpPr>
+        <dsp:cNvPr id="0" name=""/>
+        <dsp:cNvSpPr/>
+      </dsp:nvSpPr>
+      <dsp:spPr>
+        <a:xfrm>
+          <a:off x="2667000" y="2332619"/>
+          <a:ext cx="2667000" cy="519823"/>
+        </a:xfrm>
+        <a:prstGeom prst="rect">
+          <a:avLst/>
+        </a:prstGeom>
+        <a:solidFill>
+          <a:schemeClr val="accent3">
+            <a:tint val="40000"/>
+            <a:alpha val="90000"/>
+            <a:hueOff val="1217485"/>
+            <a:satOff val="60000"/>
+            <a:lumOff val="1067"/>
+            <a:alphaOff val="0"/>
+          </a:schemeClr>
+        </a:solidFill>
+        <a:ln w="12700" cap="flat" cmpd="sng" algn="ctr">
+          <a:solidFill>
+            <a:schemeClr val="accent3">
+              <a:tint val="40000"/>
+              <a:alpha val="90000"/>
+              <a:hueOff val="1217485"/>
+              <a:satOff val="60000"/>
+              <a:lumOff val="1067"/>
+              <a:alphaOff val="0"/>
+            </a:schemeClr>
+          </a:solidFill>
+          <a:prstDash val="solid"/>
+          <a:miter lim="800000"/>
+        </a:ln>
+        <a:effectLst/>
+      </dsp:spPr>
+      <dsp:style>
+        <a:lnRef idx="2">
+          <a:scrgbClr r="0" g="0" b="0"/>
+        </a:lnRef>
+        <a:fillRef idx="1">
+          <a:scrgbClr r="0" g="0" b="0"/>
+        </a:fillRef>
+        <a:effectRef idx="0">
+          <a:scrgbClr r="0" g="0" b="0"/>
+        </a:effectRef>
+        <a:fontRef idx="minor"/>
+      </dsp:style>
+      <dsp:txBody>
+        <a:bodyPr spcFirstLastPara="0" vert="horz" wrap="square" lIns="156464" tIns="27940" rIns="156464" bIns="27940" numCol="1" spcCol="1270" anchor="ctr" anchorCtr="0">
+          <a:noAutofit/>
+        </a:bodyPr>
+        <a:lstStyle/>
+        <a:p>
+          <a:pPr lvl="0" algn="l" defTabSz="914400">
+            <a:lnSpc>
+              <a:spcPct val="90000"/>
+            </a:lnSpc>
+            <a:spcBef>
+              <a:spcPct val="0"/>
+            </a:spcBef>
+            <a:spcAft>
+              <a:spcPct val="35000"/>
+            </a:spcAft>
+            <a:buNone/>
+          </a:pPr>
+          <a:r>
+            <a:rPr lang="fr-FR" sz="2200" b="0" i="0" kern="1200" noProof="0" dirty="0" smtClean="0">
+              <a:latin typeface="Franklin Gothic Medium"/>
+              <a:ea typeface="+mn-ea"/>
+              <a:cs typeface="+mn-cs"/>
+            </a:rPr>
+            <a:t>Détection</a:t>
+          </a:r>
+          <a:endParaRPr lang="fr-FR" sz="2200" b="0" i="0" kern="1200" noProof="0" dirty="0">
+            <a:latin typeface="Franklin Gothic Medium"/>
+            <a:ea typeface="+mn-ea"/>
+            <a:cs typeface="+mn-cs"/>
+          </a:endParaRPr>
+        </a:p>
+      </dsp:txBody>
+      <dsp:txXfrm>
+        <a:off x="2667000" y="2332619"/>
+        <a:ext cx="2667000" cy="519823"/>
+      </dsp:txXfrm>
+    </dsp:sp>
+    <dsp:sp modelId="{A48265CE-F3A3-46DB-9DD2-97590B4DBB84}">
+      <dsp:nvSpPr>
+        <dsp:cNvPr id="0" name=""/>
+        <dsp:cNvSpPr/>
+      </dsp:nvSpPr>
+      <dsp:spPr>
+        <a:xfrm rot="10800000">
+          <a:off x="0" y="808"/>
+          <a:ext cx="5334000" cy="1738539"/>
+        </a:xfrm>
+        <a:prstGeom prst="upArrowCallout">
+          <a:avLst/>
+        </a:prstGeom>
+        <a:solidFill>
+          <a:schemeClr val="accent3">
+            <a:hueOff val="2710599"/>
+            <a:satOff val="100000"/>
+            <a:lumOff val="-14706"/>
+            <a:alphaOff val="0"/>
+          </a:schemeClr>
+        </a:solidFill>
+        <a:ln w="12700" cap="flat" cmpd="sng" algn="ctr">
+          <a:solidFill>
+            <a:schemeClr val="lt1">
+              <a:hueOff val="0"/>
+              <a:satOff val="0"/>
+              <a:lumOff val="0"/>
+              <a:alphaOff val="0"/>
+            </a:schemeClr>
+          </a:solidFill>
+          <a:prstDash val="solid"/>
+          <a:miter lim="800000"/>
+        </a:ln>
+        <a:effectLst/>
+      </dsp:spPr>
+      <dsp:style>
+        <a:lnRef idx="2">
+          <a:scrgbClr r="0" g="0" b="0"/>
+        </a:lnRef>
+        <a:fillRef idx="1">
+          <a:scrgbClr r="0" g="0" b="0"/>
+        </a:fillRef>
+        <a:effectRef idx="0">
+          <a:scrgbClr r="0" g="0" b="0"/>
+        </a:effectRef>
+        <a:fontRef idx="minor">
+          <a:schemeClr val="lt1"/>
+        </a:fontRef>
+      </dsp:style>
+      <dsp:txBody>
+        <a:bodyPr spcFirstLastPara="0" vert="horz" wrap="square" lIns="156464" tIns="156464" rIns="156464" bIns="156464" numCol="1" spcCol="1270" anchor="ctr" anchorCtr="0">
+          <a:noAutofit/>
+        </a:bodyPr>
+        <a:lstStyle/>
+        <a:p>
+          <a:pPr lvl="0" algn="ctr" defTabSz="914400">
+            <a:lnSpc>
+              <a:spcPct val="90000"/>
+            </a:lnSpc>
+            <a:spcBef>
+              <a:spcPct val="0"/>
+            </a:spcBef>
+            <a:spcAft>
+              <a:spcPct val="35000"/>
+            </a:spcAft>
+            <a:buNone/>
+          </a:pPr>
+          <a:r>
+            <a:rPr lang="fr-FR" sz="2200" kern="1200" noProof="0" dirty="0" smtClean="0"/>
+            <a:t>Caractérisation d’un signal</a:t>
+          </a:r>
+          <a:endParaRPr lang="fr-FR" sz="2200" kern="1200" noProof="0" dirty="0"/>
+        </a:p>
+      </dsp:txBody>
+      <dsp:txXfrm rot="-10800000">
+        <a:off x="0" y="808"/>
+        <a:ext cx="5334000" cy="610227"/>
+      </dsp:txXfrm>
+    </dsp:sp>
+    <dsp:sp modelId="{59FFE57C-E5F2-4FBD-AA4D-8DB27381892F}">
+      <dsp:nvSpPr>
+        <dsp:cNvPr id="0" name=""/>
+        <dsp:cNvSpPr/>
+      </dsp:nvSpPr>
+      <dsp:spPr>
+        <a:xfrm>
+          <a:off x="0" y="611036"/>
+          <a:ext cx="2667000" cy="519823"/>
+        </a:xfrm>
+        <a:prstGeom prst="rect">
+          <a:avLst/>
+        </a:prstGeom>
+        <a:solidFill>
+          <a:schemeClr val="accent3">
+            <a:tint val="40000"/>
+            <a:alpha val="90000"/>
+            <a:hueOff val="1623313"/>
+            <a:satOff val="80000"/>
+            <a:lumOff val="1423"/>
+            <a:alphaOff val="0"/>
+          </a:schemeClr>
+        </a:solidFill>
+        <a:ln w="12700" cap="flat" cmpd="sng" algn="ctr">
+          <a:solidFill>
+            <a:schemeClr val="accent3">
+              <a:tint val="40000"/>
+              <a:alpha val="90000"/>
+              <a:hueOff val="1623313"/>
+              <a:satOff val="80000"/>
+              <a:lumOff val="1423"/>
+              <a:alphaOff val="0"/>
+            </a:schemeClr>
+          </a:solidFill>
+          <a:prstDash val="solid"/>
+          <a:miter lim="800000"/>
+        </a:ln>
+        <a:effectLst/>
+      </dsp:spPr>
+      <dsp:style>
+        <a:lnRef idx="2">
+          <a:scrgbClr r="0" g="0" b="0"/>
+        </a:lnRef>
+        <a:fillRef idx="1">
+          <a:scrgbClr r="0" g="0" b="0"/>
+        </a:fillRef>
+        <a:effectRef idx="0">
+          <a:scrgbClr r="0" g="0" b="0"/>
+        </a:effectRef>
+        <a:fontRef idx="minor"/>
+      </dsp:style>
+      <dsp:txBody>
+        <a:bodyPr spcFirstLastPara="0" vert="horz" wrap="square" lIns="156464" tIns="27940" rIns="156464" bIns="27940" numCol="1" spcCol="1270" anchor="ctr" anchorCtr="0">
+          <a:noAutofit/>
+        </a:bodyPr>
+        <a:lstStyle/>
+        <a:p>
+          <a:pPr lvl="0" algn="l" defTabSz="914400">
+            <a:lnSpc>
+              <a:spcPct val="90000"/>
+            </a:lnSpc>
+            <a:spcBef>
+              <a:spcPct val="0"/>
+            </a:spcBef>
+            <a:spcAft>
+              <a:spcPct val="35000"/>
+            </a:spcAft>
+            <a:buNone/>
+          </a:pPr>
+          <a:r>
+            <a:rPr lang="fr-FR" sz="2200" b="0" i="0" kern="1200" noProof="0" dirty="0" smtClean="0">
+              <a:latin typeface="Franklin Gothic Medium"/>
+              <a:ea typeface="+mn-ea"/>
+              <a:cs typeface="+mn-cs"/>
+            </a:rPr>
+            <a:t>Spectre</a:t>
+          </a:r>
+          <a:endParaRPr lang="fr-FR" sz="2200" b="0" i="0" kern="1200" noProof="0" dirty="0">
+            <a:latin typeface="Franklin Gothic Medium"/>
+            <a:ea typeface="+mn-ea"/>
+            <a:cs typeface="+mn-cs"/>
+          </a:endParaRPr>
+        </a:p>
+      </dsp:txBody>
+      <dsp:txXfrm>
+        <a:off x="0" y="611036"/>
+        <a:ext cx="2667000" cy="519823"/>
+      </dsp:txXfrm>
+    </dsp:sp>
+    <dsp:sp modelId="{3EC7D028-ECEA-492B-A6F1-68E9B57B69C6}">
+      <dsp:nvSpPr>
+        <dsp:cNvPr id="0" name=""/>
+        <dsp:cNvSpPr/>
+      </dsp:nvSpPr>
+      <dsp:spPr>
+        <a:xfrm>
+          <a:off x="2667000" y="611036"/>
+          <a:ext cx="2667000" cy="519823"/>
+        </a:xfrm>
+        <a:prstGeom prst="rect">
+          <a:avLst/>
+        </a:prstGeom>
+        <a:solidFill>
+          <a:schemeClr val="accent3">
+            <a:tint val="40000"/>
+            <a:alpha val="90000"/>
+            <a:hueOff val="2029141"/>
+            <a:satOff val="100000"/>
+            <a:lumOff val="1779"/>
+            <a:alphaOff val="0"/>
+          </a:schemeClr>
+        </a:solidFill>
+        <a:ln w="12700" cap="flat" cmpd="sng" algn="ctr">
+          <a:solidFill>
+            <a:schemeClr val="accent3">
+              <a:tint val="40000"/>
+              <a:alpha val="90000"/>
+              <a:hueOff val="2029141"/>
+              <a:satOff val="100000"/>
+              <a:lumOff val="1779"/>
+              <a:alphaOff val="0"/>
+            </a:schemeClr>
+          </a:solidFill>
+          <a:prstDash val="solid"/>
+          <a:miter lim="800000"/>
+        </a:ln>
+        <a:effectLst/>
+      </dsp:spPr>
+      <dsp:style>
+        <a:lnRef idx="2">
+          <a:scrgbClr r="0" g="0" b="0"/>
+        </a:lnRef>
+        <a:fillRef idx="1">
+          <a:scrgbClr r="0" g="0" b="0"/>
+        </a:fillRef>
+        <a:effectRef idx="0">
+          <a:scrgbClr r="0" g="0" b="0"/>
+        </a:effectRef>
+        <a:fontRef idx="minor"/>
+      </dsp:style>
+      <dsp:txBody>
+        <a:bodyPr spcFirstLastPara="0" vert="horz" wrap="square" lIns="156464" tIns="27940" rIns="156464" bIns="27940" numCol="1" spcCol="1270" anchor="ctr" anchorCtr="0">
+          <a:noAutofit/>
+        </a:bodyPr>
+        <a:lstStyle/>
+        <a:p>
+          <a:pPr lvl="0" algn="l" defTabSz="914400">
+            <a:lnSpc>
+              <a:spcPct val="90000"/>
+            </a:lnSpc>
+            <a:spcBef>
+              <a:spcPct val="0"/>
+            </a:spcBef>
+            <a:spcAft>
+              <a:spcPct val="35000"/>
+            </a:spcAft>
+            <a:buNone/>
+          </a:pPr>
+          <a:r>
+            <a:rPr lang="fr-FR" sz="2200" b="0" i="0" kern="1200" noProof="0" dirty="0" smtClean="0">
+              <a:latin typeface="Franklin Gothic Medium"/>
+              <a:ea typeface="+mn-ea"/>
+              <a:cs typeface="+mn-cs"/>
+            </a:rPr>
+            <a:t>Valeurs singulières</a:t>
+          </a:r>
+          <a:endParaRPr lang="fr-FR" sz="2200" b="0" i="0" kern="1200" noProof="0" dirty="0">
+            <a:latin typeface="Franklin Gothic Medium"/>
+            <a:ea typeface="+mn-ea"/>
+            <a:cs typeface="+mn-cs"/>
+          </a:endParaRPr>
+        </a:p>
+      </dsp:txBody>
+      <dsp:txXfrm>
+        <a:off x="2667000" y="611036"/>
+        <a:ext cx="2667000" cy="519823"/>
+      </dsp:txXfrm>
+    </dsp:sp>
   </dsp:spTree>
 </dsp:drawing>
 </file>
@@ -10094,18 +10866,14 @@
           <a:p>
             <a:r>
               <a:rPr lang="fr-FR" dirty="0" smtClean="0"/>
-              <a:t>Les transformées </a:t>
-            </a:r>
-            <a:r>
-              <a:rPr lang="fr-FR" dirty="0" smtClean="0"/>
-              <a:t>de Fourier</a:t>
+              <a:t>Les transformées de Fourier</a:t>
             </a:r>
             <a:endParaRPr lang="fr-FR" dirty="0"/>
           </a:p>
         </p:txBody>
       </p:sp>
-      <mc:AlternateContent xmlns:mc="http://schemas.openxmlformats.org/markup-compatibility/2006">
-        <mc:Choice xmlns:a14="http://schemas.microsoft.com/office/drawing/2010/main" Requires="a14">
+      <mc:AlternateContent xmlns:mc="http://schemas.openxmlformats.org/markup-compatibility/2006" xmlns:a14="http://schemas.microsoft.com/office/drawing/2010/main">
+        <mc:Choice Requires="a14">
           <p:sp>
             <p:nvSpPr>
               <p:cNvPr id="3" name="Espace réservé du contenu 2"/>
@@ -10146,11 +10914,7 @@
                 </a14:m>
                 <a:r>
                   <a:rPr lang="fr-FR" dirty="0" smtClean="0"/>
-                  <a:t> </a:t>
-                </a:r>
-                <a:r>
-                  <a:rPr lang="fr-FR" dirty="0" smtClean="0"/>
-                  <a:t>échantillons : la transformée de </a:t>
+                  <a:t> échantillons : la transformée de </a:t>
                 </a:r>
                 <a:r>
                   <a:rPr lang="fr-FR" dirty="0"/>
@@ -10160,7 +10924,6 @@
                   <a:rPr lang="fr-FR" dirty="0" smtClean="0"/>
                   <a:t>discrète</a:t>
                 </a:r>
-                <a:endParaRPr lang="fr-FR" dirty="0" smtClean="0"/>
               </a:p>
               <a:p>
                 <a:pPr marL="0" indent="0">
@@ -10292,13 +11055,7 @@
                             <a:rPr lang="fr-FR" i="1">
                               <a:latin typeface="Cambria Math" panose="02040503050406030204" pitchFamily="18" charset="0"/>
                             </a:rPr>
-                            <m:t>=</m:t>
-                          </m:r>
-                          <m:r>
-                            <a:rPr lang="fr-FR" i="1">
-                              <a:latin typeface="Cambria Math" panose="02040503050406030204" pitchFamily="18" charset="0"/>
-                            </a:rPr>
-                            <m:t>0</m:t>
+                            <m:t>=0</m:t>
                           </m:r>
                         </m:sub>
                         <m:sup>
@@ -10431,12 +11188,11 @@
                   <a:rPr lang="fr-FR" dirty="0" smtClean="0"/>
                   <a:t>Algorithme de calcul rapide : FFT, que l’on utilise fréquemment pour simplifier divers autres calculs.</a:t>
                 </a:r>
-                <a:endParaRPr lang="fr-FR" dirty="0" smtClean="0"/>
               </a:p>
             </p:txBody>
           </p:sp>
         </mc:Choice>
-        <mc:Fallback>
+        <mc:Fallback xmlns="">
           <p:sp>
             <p:nvSpPr>
               <p:cNvPr id="3" name="Espace réservé du contenu 2"/>
@@ -10538,11 +11294,7 @@
           <a:p>
             <a:r>
               <a:rPr lang="fr-FR" dirty="0" smtClean="0"/>
-              <a:t>La transformée de </a:t>
-            </a:r>
-            <a:r>
-              <a:rPr lang="fr-FR" dirty="0" smtClean="0"/>
-              <a:t>Fourier à fenêtre glissante (SWFT)</a:t>
+              <a:t>La transformée de Fourier à fenêtre glissante (SWFT)</a:t>
             </a:r>
             <a:endParaRPr lang="fr-FR" dirty="0"/>
           </a:p>
@@ -10572,6 +11324,27 @@
                 </a:schemeClr>
               </a:buClr>
             </a:pPr>
+            <a:r>
+              <a:rPr lang="fr-FR" dirty="0" smtClean="0"/>
+              <a:t>Pour remédier à certaines insuffisances des transformées de Fourier, particulièrement la perte de tous les aspects temporels (début, fin, singularités, etc.)</a:t>
+            </a:r>
+          </a:p>
+          <a:p>
+            <a:pPr>
+              <a:buClr>
+                <a:schemeClr val="tx1">
+                  <a:lumMod val="75000"/>
+                </a:schemeClr>
+              </a:buClr>
+            </a:pPr>
+            <a:r>
+              <a:rPr lang="fr-FR" dirty="0" smtClean="0"/>
+              <a:t>On détecte des aspects temporels de la largeur de </a:t>
+            </a:r>
+            <a:r>
+              <a:rPr lang="fr-FR" smtClean="0"/>
+              <a:t>la fenêtre</a:t>
+            </a:r>
             <a:endParaRPr lang="fr-FR" dirty="0" smtClean="0"/>
           </a:p>
         </p:txBody>
@@ -10650,34 +11423,384 @@
           </a:p>
         </p:txBody>
       </p:sp>
-      <p:sp>
-        <p:nvSpPr>
-          <p:cNvPr id="3" name="Espace réservé du contenu 2"/>
-          <p:cNvSpPr>
-            <a:spLocks noGrp="1"/>
-          </p:cNvSpPr>
-          <p:nvPr>
-            <p:ph idx="1"/>
-          </p:nvPr>
-        </p:nvSpPr>
-        <p:spPr/>
-        <p:txBody>
-          <a:bodyPr>
-            <a:normAutofit/>
-          </a:bodyPr>
-          <a:lstStyle/>
-          <a:p>
-            <a:pPr>
-              <a:buClr>
-                <a:schemeClr val="tx1">
-                  <a:lumMod val="75000"/>
-                </a:schemeClr>
-              </a:buClr>
-            </a:pPr>
-            <a:endParaRPr lang="fr-FR" dirty="0" smtClean="0"/>
-          </a:p>
-        </p:txBody>
-      </p:sp>
+      <mc:AlternateContent xmlns:mc="http://schemas.openxmlformats.org/markup-compatibility/2006">
+        <mc:Choice xmlns:a14="http://schemas.microsoft.com/office/drawing/2010/main" Requires="a14">
+          <p:sp>
+            <p:nvSpPr>
+              <p:cNvPr id="3" name="Espace réservé du contenu 2"/>
+              <p:cNvSpPr>
+                <a:spLocks noGrp="1"/>
+              </p:cNvSpPr>
+              <p:nvPr>
+                <p:ph idx="1"/>
+              </p:nvPr>
+            </p:nvSpPr>
+            <p:spPr/>
+            <p:txBody>
+              <a:bodyPr>
+                <a:normAutofit/>
+              </a:bodyPr>
+              <a:lstStyle/>
+              <a:p>
+                <a:pPr>
+                  <a:buClr>
+                    <a:schemeClr val="tx1">
+                      <a:lumMod val="75000"/>
+                    </a:schemeClr>
+                  </a:buClr>
+                </a:pPr>
+                <a:r>
+                  <a:rPr lang="fr-FR" dirty="0" smtClean="0"/>
+                  <a:t>On ne parle plus de domaine temps-fréquence, mais </a:t>
+                </a:r>
+                <a:r>
+                  <a:rPr lang="fr-FR" b="1" i="1" dirty="0" smtClean="0"/>
+                  <a:t>temps-échelle</a:t>
+                </a:r>
+              </a:p>
+              <a:p>
+                <a:pPr>
+                  <a:buClr>
+                    <a:schemeClr val="tx1">
+                      <a:lumMod val="75000"/>
+                    </a:schemeClr>
+                  </a:buClr>
+                </a:pPr>
+                <a:r>
+                  <a:rPr lang="fr-FR" dirty="0" smtClean="0"/>
+                  <a:t>Une ondelette est une fonction </a:t>
+                </a:r>
+                <a14:m>
+                  <m:oMath xmlns:m="http://schemas.openxmlformats.org/officeDocument/2006/math">
+                    <m:r>
+                      <m:rPr>
+                        <m:sty m:val="p"/>
+                      </m:rPr>
+                      <a:rPr lang="el-GR" i="1" smtClean="0">
+                        <a:latin typeface="Cambria Math" panose="02040503050406030204" pitchFamily="18" charset="0"/>
+                        <a:ea typeface="Cambria Math" panose="02040503050406030204" pitchFamily="18" charset="0"/>
+                      </a:rPr>
+                      <m:t>ψ</m:t>
+                    </m:r>
+                  </m:oMath>
+                </a14:m>
+                <a:r>
+                  <a:rPr lang="fr-FR" dirty="0" smtClean="0"/>
+                  <a:t> normée de moyenne nulle</a:t>
+                </a:r>
+              </a:p>
+              <a:p>
+                <a:pPr>
+                  <a:buClr>
+                    <a:schemeClr val="tx1">
+                      <a:lumMod val="75000"/>
+                    </a:schemeClr>
+                  </a:buClr>
+                </a:pPr>
+                <a:r>
+                  <a:rPr lang="fr-FR" dirty="0" smtClean="0"/>
+                  <a:t>Temps : translation d’un facteur </a:t>
+                </a:r>
+                <a14:m>
+                  <m:oMath xmlns:m="http://schemas.openxmlformats.org/officeDocument/2006/math">
+                    <m:r>
+                      <a:rPr lang="fr-FR" b="0" i="1" smtClean="0">
+                        <a:latin typeface="Cambria Math" panose="02040503050406030204" pitchFamily="18" charset="0"/>
+                      </a:rPr>
+                      <m:t>𝑏</m:t>
+                    </m:r>
+                    <m:r>
+                      <a:rPr lang="fr-FR" b="0" i="1" smtClean="0">
+                        <a:latin typeface="Cambria Math" panose="02040503050406030204" pitchFamily="18" charset="0"/>
+                      </a:rPr>
+                      <m:t> :</m:t>
+                    </m:r>
+                    <m:r>
+                      <m:rPr>
+                        <m:sty m:val="p"/>
+                      </m:rPr>
+                      <a:rPr lang="el-GR" i="1">
+                        <a:latin typeface="Cambria Math" panose="02040503050406030204" pitchFamily="18" charset="0"/>
+                        <a:ea typeface="Cambria Math" panose="02040503050406030204" pitchFamily="18" charset="0"/>
+                      </a:rPr>
+                      <m:t>ψ</m:t>
+                    </m:r>
+                    <m:r>
+                      <a:rPr lang="fr-FR" b="0" i="0" smtClean="0">
+                        <a:latin typeface="Cambria Math" panose="02040503050406030204" pitchFamily="18" charset="0"/>
+                        <a:ea typeface="Cambria Math" panose="02040503050406030204" pitchFamily="18" charset="0"/>
+                      </a:rPr>
+                      <m:t>(</m:t>
+                    </m:r>
+                    <m:r>
+                      <m:rPr>
+                        <m:sty m:val="p"/>
+                      </m:rPr>
+                      <a:rPr lang="fr-FR" b="0" i="0" smtClean="0">
+                        <a:latin typeface="Cambria Math" panose="02040503050406030204" pitchFamily="18" charset="0"/>
+                        <a:ea typeface="Cambria Math" panose="02040503050406030204" pitchFamily="18" charset="0"/>
+                      </a:rPr>
+                      <m:t>t</m:t>
+                    </m:r>
+                    <m:r>
+                      <a:rPr lang="fr-FR" b="0" i="0" smtClean="0">
+                        <a:latin typeface="Cambria Math" panose="02040503050406030204" pitchFamily="18" charset="0"/>
+                        <a:ea typeface="Cambria Math" panose="02040503050406030204" pitchFamily="18" charset="0"/>
+                      </a:rPr>
+                      <m:t>−</m:t>
+                    </m:r>
+                    <m:r>
+                      <m:rPr>
+                        <m:sty m:val="p"/>
+                      </m:rPr>
+                      <a:rPr lang="fr-FR" b="0" i="0" smtClean="0">
+                        <a:latin typeface="Cambria Math" panose="02040503050406030204" pitchFamily="18" charset="0"/>
+                        <a:ea typeface="Cambria Math" panose="02040503050406030204" pitchFamily="18" charset="0"/>
+                      </a:rPr>
+                      <m:t>b</m:t>
+                    </m:r>
+                    <m:r>
+                      <a:rPr lang="fr-FR" b="0" i="0" smtClean="0">
+                        <a:latin typeface="Cambria Math" panose="02040503050406030204" pitchFamily="18" charset="0"/>
+                        <a:ea typeface="Cambria Math" panose="02040503050406030204" pitchFamily="18" charset="0"/>
+                      </a:rPr>
+                      <m:t>)</m:t>
+                    </m:r>
+                  </m:oMath>
+                </a14:m>
+                <a:endParaRPr lang="fr-FR" dirty="0" smtClean="0"/>
+              </a:p>
+              <a:p>
+                <a:pPr>
+                  <a:buClr>
+                    <a:schemeClr val="tx1">
+                      <a:lumMod val="75000"/>
+                    </a:schemeClr>
+                  </a:buClr>
+                </a:pPr>
+                <a:r>
+                  <a:rPr lang="fr-FR" dirty="0" smtClean="0"/>
+                  <a:t>Echelle : dilatation d’un facteur </a:t>
+                </a:r>
+                <a14:m>
+                  <m:oMath xmlns:m="http://schemas.openxmlformats.org/officeDocument/2006/math">
+                    <m:r>
+                      <a:rPr lang="fr-FR" b="0" i="1" smtClean="0">
+                        <a:latin typeface="Cambria Math" panose="02040503050406030204" pitchFamily="18" charset="0"/>
+                      </a:rPr>
+                      <m:t>𝑎</m:t>
+                    </m:r>
+                    <m:r>
+                      <a:rPr lang="fr-FR" b="0" i="1" smtClean="0">
+                        <a:latin typeface="Cambria Math" panose="02040503050406030204" pitchFamily="18" charset="0"/>
+                      </a:rPr>
+                      <m:t> :</m:t>
+                    </m:r>
+                    <m:f>
+                      <m:fPr>
+                        <m:ctrlPr>
+                          <a:rPr lang="fr-FR" b="0" i="1" smtClean="0">
+                            <a:latin typeface="Cambria Math" panose="02040503050406030204" pitchFamily="18" charset="0"/>
+                          </a:rPr>
+                        </m:ctrlPr>
+                      </m:fPr>
+                      <m:num>
+                        <m:r>
+                          <a:rPr lang="fr-FR" b="0" i="1" smtClean="0">
+                            <a:latin typeface="Cambria Math" panose="02040503050406030204" pitchFamily="18" charset="0"/>
+                          </a:rPr>
+                          <m:t>1</m:t>
+                        </m:r>
+                      </m:num>
+                      <m:den>
+                        <m:rad>
+                          <m:radPr>
+                            <m:degHide m:val="on"/>
+                            <m:ctrlPr>
+                              <a:rPr lang="fr-FR" b="0" i="1" smtClean="0">
+                                <a:latin typeface="Cambria Math" panose="02040503050406030204" pitchFamily="18" charset="0"/>
+                              </a:rPr>
+                            </m:ctrlPr>
+                          </m:radPr>
+                          <m:deg/>
+                          <m:e>
+                            <m:r>
+                              <a:rPr lang="fr-FR" b="0" i="1" smtClean="0">
+                                <a:latin typeface="Cambria Math" panose="02040503050406030204" pitchFamily="18" charset="0"/>
+                              </a:rPr>
+                              <m:t>𝑎</m:t>
+                            </m:r>
+                          </m:e>
+                        </m:rad>
+                      </m:den>
+                    </m:f>
+                    <m:r>
+                      <m:rPr>
+                        <m:sty m:val="p"/>
+                      </m:rPr>
+                      <a:rPr lang="el-GR" i="1">
+                        <a:latin typeface="Cambria Math" panose="02040503050406030204" pitchFamily="18" charset="0"/>
+                        <a:ea typeface="Cambria Math" panose="02040503050406030204" pitchFamily="18" charset="0"/>
+                      </a:rPr>
+                      <m:t>ψ</m:t>
+                    </m:r>
+                    <m:d>
+                      <m:dPr>
+                        <m:ctrlPr>
+                          <a:rPr lang="fr-FR" i="1" smtClean="0">
+                            <a:latin typeface="Cambria Math" panose="02040503050406030204" pitchFamily="18" charset="0"/>
+                            <a:ea typeface="Cambria Math" panose="02040503050406030204" pitchFamily="18" charset="0"/>
+                          </a:rPr>
+                        </m:ctrlPr>
+                      </m:dPr>
+                      <m:e>
+                        <m:f>
+                          <m:fPr>
+                            <m:ctrlPr>
+                              <a:rPr lang="fr-FR" i="1">
+                                <a:latin typeface="Cambria Math" panose="02040503050406030204" pitchFamily="18" charset="0"/>
+                                <a:ea typeface="Cambria Math" panose="02040503050406030204" pitchFamily="18" charset="0"/>
+                              </a:rPr>
+                            </m:ctrlPr>
+                          </m:fPr>
+                          <m:num>
+                            <m:r>
+                              <a:rPr lang="fr-FR" i="1">
+                                <a:latin typeface="Cambria Math" panose="02040503050406030204" pitchFamily="18" charset="0"/>
+                                <a:ea typeface="Cambria Math" panose="02040503050406030204" pitchFamily="18" charset="0"/>
+                              </a:rPr>
+                              <m:t>𝑡</m:t>
+                            </m:r>
+                          </m:num>
+                          <m:den>
+                            <m:r>
+                              <a:rPr lang="fr-FR" i="1">
+                                <a:latin typeface="Cambria Math" panose="02040503050406030204" pitchFamily="18" charset="0"/>
+                                <a:ea typeface="Cambria Math" panose="02040503050406030204" pitchFamily="18" charset="0"/>
+                              </a:rPr>
+                              <m:t>𝑎</m:t>
+                            </m:r>
+                          </m:den>
+                        </m:f>
+                      </m:e>
+                    </m:d>
+                  </m:oMath>
+                </a14:m>
+                <a:endParaRPr lang="fr-FR" dirty="0" smtClean="0"/>
+              </a:p>
+              <a:p>
+                <a:pPr>
+                  <a:buClr>
+                    <a:schemeClr val="tx1">
+                      <a:lumMod val="75000"/>
+                    </a:schemeClr>
+                  </a:buClr>
+                </a:pPr>
+                <a:r>
+                  <a:rPr lang="fr-FR" dirty="0"/>
+                  <a:t>la transformée en ondelettes de f mesure la variation de f </a:t>
+                </a:r>
+                <a:endParaRPr lang="fr-FR" dirty="0" smtClean="0"/>
+              </a:p>
+              <a:p>
+                <a:pPr marL="0" indent="0">
+                  <a:buClr>
+                    <a:schemeClr val="tx1">
+                      <a:lumMod val="75000"/>
+                    </a:schemeClr>
+                  </a:buClr>
+                  <a:buNone/>
+                </a:pPr>
+                <a:r>
+                  <a:rPr lang="fr-FR" dirty="0" smtClean="0"/>
+                  <a:t>	- dans </a:t>
+                </a:r>
+                <a:r>
+                  <a:rPr lang="fr-FR" dirty="0"/>
+                  <a:t>un voisinage de </a:t>
+                </a:r>
+                <a14:m>
+                  <m:oMath xmlns:m="http://schemas.openxmlformats.org/officeDocument/2006/math">
+                    <m:r>
+                      <a:rPr lang="fr-FR" i="1" dirty="0" smtClean="0">
+                        <a:latin typeface="Cambria Math" panose="02040503050406030204" pitchFamily="18" charset="0"/>
+                      </a:rPr>
+                      <m:t>𝑏</m:t>
+                    </m:r>
+                  </m:oMath>
+                </a14:m>
+                <a:r>
+                  <a:rPr lang="fr-FR" dirty="0"/>
+                  <a:t> </a:t>
+                </a:r>
+                <a:endParaRPr lang="fr-FR" dirty="0" smtClean="0"/>
+              </a:p>
+              <a:p>
+                <a:pPr marL="0" indent="0">
+                  <a:buClr>
+                    <a:schemeClr val="tx1">
+                      <a:lumMod val="75000"/>
+                    </a:schemeClr>
+                  </a:buClr>
+                  <a:buNone/>
+                </a:pPr>
+                <a:r>
+                  <a:rPr lang="fr-FR" dirty="0" smtClean="0"/>
+                  <a:t>	- de </a:t>
+                </a:r>
+                <a:r>
+                  <a:rPr lang="fr-FR" dirty="0"/>
+                  <a:t>taille proportionnelle à </a:t>
+                </a:r>
+                <a14:m>
+                  <m:oMath xmlns:m="http://schemas.openxmlformats.org/officeDocument/2006/math">
+                    <m:r>
+                      <a:rPr lang="fr-FR" i="1" dirty="0" smtClean="0">
+                        <a:latin typeface="Cambria Math" panose="02040503050406030204" pitchFamily="18" charset="0"/>
+                      </a:rPr>
+                      <m:t>𝑎</m:t>
+                    </m:r>
+                  </m:oMath>
+                </a14:m>
+                <a:endParaRPr lang="fr-FR" dirty="0" smtClean="0"/>
+              </a:p>
+            </p:txBody>
+          </p:sp>
+        </mc:Choice>
+        <mc:Fallback>
+          <p:sp>
+            <p:nvSpPr>
+              <p:cNvPr id="3" name="Espace réservé du contenu 2"/>
+              <p:cNvSpPr>
+                <a:spLocks noGrp="1" noRot="1" noChangeAspect="1" noMove="1" noResize="1" noEditPoints="1" noAdjustHandles="1" noChangeArrowheads="1" noChangeShapeType="1" noTextEdit="1"/>
+              </p:cNvSpPr>
+              <p:nvPr>
+                <p:ph idx="1"/>
+              </p:nvPr>
+            </p:nvSpPr>
+            <p:spPr>
+              <a:blipFill rotWithShape="0">
+                <a:blip r:embed="rId2"/>
+                <a:stretch>
+                  <a:fillRect l="-467" t="-1733"/>
+                </a:stretch>
+              </a:blipFill>
+            </p:spPr>
+            <p:txBody>
+              <a:bodyPr/>
+              <a:lstStyle/>
+              <a:p>
+                <a:r>
+                  <a:rPr lang="fr-FR">
+                    <a:noFill/>
+                  </a:rPr>
+                  <a:t> </a:t>
+                </a:r>
+              </a:p>
+            </p:txBody>
+          </p:sp>
+        </mc:Fallback>
+      </mc:AlternateContent>
     </p:spTree>
     <p:extLst>
       <p:ext uri="{BB962C8B-B14F-4D97-AF65-F5344CB8AC3E}">
@@ -10711,6 +11834,511 @@
 </file>
 
 <file path=ppt/slides/slide13.xml><?xml version="1.0" encoding="utf-8"?>
+<p:sld xmlns:a="http://schemas.openxmlformats.org/drawingml/2006/main" xmlns:r="http://schemas.openxmlformats.org/officeDocument/2006/relationships" xmlns:p="http://schemas.openxmlformats.org/presentationml/2006/main">
+  <p:cSld>
+    <p:spTree>
+      <p:nvGrpSpPr>
+        <p:cNvPr id="1" name=""/>
+        <p:cNvGrpSpPr/>
+        <p:nvPr/>
+      </p:nvGrpSpPr>
+      <p:grpSpPr>
+        <a:xfrm>
+          <a:off x="0" y="0"/>
+          <a:ext cx="0" cy="0"/>
+          <a:chOff x="0" y="0"/>
+          <a:chExt cx="0" cy="0"/>
+        </a:xfrm>
+      </p:grpSpPr>
+      <p:sp>
+        <p:nvSpPr>
+          <p:cNvPr id="2" name="Titre 1"/>
+          <p:cNvSpPr>
+            <a:spLocks noGrp="1"/>
+          </p:cNvSpPr>
+          <p:nvPr>
+            <p:ph type="title"/>
+          </p:nvPr>
+        </p:nvSpPr>
+        <p:spPr/>
+        <p:txBody>
+          <a:bodyPr>
+            <a:normAutofit/>
+          </a:bodyPr>
+          <a:lstStyle/>
+          <a:p>
+            <a:r>
+              <a:rPr lang="fr-FR" dirty="0" smtClean="0"/>
+              <a:t>La transformée en ondelettes (CWT)</a:t>
+            </a:r>
+            <a:endParaRPr lang="fr-FR" dirty="0"/>
+          </a:p>
+        </p:txBody>
+      </p:sp>
+      <mc:AlternateContent xmlns:mc="http://schemas.openxmlformats.org/markup-compatibility/2006">
+        <mc:Choice xmlns:a14="http://schemas.microsoft.com/office/drawing/2010/main" Requires="a14">
+          <p:sp>
+            <p:nvSpPr>
+              <p:cNvPr id="3" name="Espace réservé du contenu 2"/>
+              <p:cNvSpPr>
+                <a:spLocks noGrp="1"/>
+              </p:cNvSpPr>
+              <p:nvPr>
+                <p:ph idx="1"/>
+              </p:nvPr>
+            </p:nvSpPr>
+            <p:spPr/>
+            <p:txBody>
+              <a:bodyPr>
+                <a:normAutofit/>
+              </a:bodyPr>
+              <a:lstStyle/>
+              <a:p>
+                <a:pPr marL="0" indent="0">
+                  <a:buClr>
+                    <a:schemeClr val="tx1">
+                      <a:lumMod val="75000"/>
+                    </a:schemeClr>
+                  </a:buClr>
+                  <a:buNone/>
+                </a:pPr>
+                <a14:m>
+                  <m:oMathPara xmlns:m="http://schemas.openxmlformats.org/officeDocument/2006/math">
+                    <m:oMathParaPr>
+                      <m:jc m:val="centerGroup"/>
+                    </m:oMathParaPr>
+                    <m:oMath xmlns:m="http://schemas.openxmlformats.org/officeDocument/2006/math">
+                      <m:r>
+                        <a:rPr lang="fr-FR" i="1">
+                          <a:latin typeface="Cambria Math" panose="02040503050406030204" pitchFamily="18" charset="0"/>
+                        </a:rPr>
+                        <m:t>𝑓</m:t>
+                      </m:r>
+                      <m:d>
+                        <m:dPr>
+                          <m:ctrlPr>
+                            <a:rPr lang="fr-FR" i="1">
+                              <a:latin typeface="Cambria Math" panose="02040503050406030204" pitchFamily="18" charset="0"/>
+                            </a:rPr>
+                          </m:ctrlPr>
+                        </m:dPr>
+                        <m:e>
+                          <m:r>
+                            <a:rPr lang="fr-FR" i="1">
+                              <a:latin typeface="Cambria Math" panose="02040503050406030204" pitchFamily="18" charset="0"/>
+                            </a:rPr>
+                            <m:t>𝑡</m:t>
+                          </m:r>
+                        </m:e>
+                      </m:d>
+                      <m:groupChr>
+                        <m:groupChrPr>
+                          <m:chr m:val="→"/>
+                          <m:vertJc m:val="bot"/>
+                          <m:ctrlPr>
+                            <a:rPr lang="fr-FR" i="1">
+                              <a:latin typeface="Cambria Math" panose="02040503050406030204" pitchFamily="18" charset="0"/>
+                            </a:rPr>
+                          </m:ctrlPr>
+                        </m:groupChrPr>
+                        <m:e>
+                          <m:r>
+                            <m:rPr>
+                              <m:brk m:alnAt="2"/>
+                            </m:rPr>
+                            <a:rPr lang="fr-FR" i="1">
+                              <a:latin typeface="Cambria Math" panose="02040503050406030204" pitchFamily="18" charset="0"/>
+                            </a:rPr>
+                            <m:t>𝐶</m:t>
+                          </m:r>
+                          <m:r>
+                            <a:rPr lang="fr-FR" i="1">
+                              <a:latin typeface="Cambria Math" panose="02040503050406030204" pitchFamily="18" charset="0"/>
+                            </a:rPr>
+                            <m:t>𝑊𝑇</m:t>
+                          </m:r>
+                        </m:e>
+                      </m:groupChr>
+                      <m:sSub>
+                        <m:sSubPr>
+                          <m:ctrlPr>
+                            <a:rPr lang="fr-FR" i="1">
+                              <a:latin typeface="Cambria Math" panose="02040503050406030204" pitchFamily="18" charset="0"/>
+                            </a:rPr>
+                          </m:ctrlPr>
+                        </m:sSubPr>
+                        <m:e>
+                          <m:r>
+                            <a:rPr lang="fr-FR" i="1">
+                              <a:latin typeface="Cambria Math" panose="02040503050406030204" pitchFamily="18" charset="0"/>
+                            </a:rPr>
+                            <m:t>𝑊</m:t>
+                          </m:r>
+                        </m:e>
+                        <m:sub>
+                          <m:sSub>
+                            <m:sSubPr>
+                              <m:ctrlPr>
+                                <a:rPr lang="fr-FR" i="1">
+                                  <a:latin typeface="Cambria Math" panose="02040503050406030204" pitchFamily="18" charset="0"/>
+                                </a:rPr>
+                              </m:ctrlPr>
+                            </m:sSubPr>
+                            <m:e>
+                              <m:r>
+                                <a:rPr lang="fr-FR" i="1">
+                                  <a:latin typeface="Cambria Math" panose="02040503050406030204" pitchFamily="18" charset="0"/>
+                                </a:rPr>
+                                <m:t>𝑓</m:t>
+                              </m:r>
+                            </m:e>
+                            <m:sub>
+                              <m:r>
+                                <a:rPr lang="fr-FR" i="1">
+                                  <a:latin typeface="Cambria Math" panose="02040503050406030204" pitchFamily="18" charset="0"/>
+                                </a:rPr>
+                                <m:t>𝑎</m:t>
+                              </m:r>
+                              <m:r>
+                                <a:rPr lang="fr-FR" i="1">
+                                  <a:latin typeface="Cambria Math" panose="02040503050406030204" pitchFamily="18" charset="0"/>
+                                </a:rPr>
+                                <m:t>,</m:t>
+                              </m:r>
+                              <m:r>
+                                <a:rPr lang="fr-FR" i="1">
+                                  <a:latin typeface="Cambria Math" panose="02040503050406030204" pitchFamily="18" charset="0"/>
+                                </a:rPr>
+                                <m:t>𝑏</m:t>
+                              </m:r>
+                            </m:sub>
+                          </m:sSub>
+                        </m:sub>
+                      </m:sSub>
+                      <m:r>
+                        <a:rPr lang="fr-FR" i="1">
+                          <a:latin typeface="Cambria Math" panose="02040503050406030204" pitchFamily="18" charset="0"/>
+                        </a:rPr>
+                        <m:t>=</m:t>
+                      </m:r>
+                      <m:nary>
+                        <m:naryPr>
+                          <m:limLoc m:val="undOvr"/>
+                          <m:ctrlPr>
+                            <a:rPr lang="fr-FR" i="1">
+                              <a:latin typeface="Cambria Math" panose="02040503050406030204" pitchFamily="18" charset="0"/>
+                            </a:rPr>
+                          </m:ctrlPr>
+                        </m:naryPr>
+                        <m:sub>
+                          <m:r>
+                            <m:rPr>
+                              <m:brk m:alnAt="24"/>
+                            </m:rPr>
+                            <a:rPr lang="fr-FR" i="1">
+                              <a:latin typeface="Cambria Math" panose="02040503050406030204" pitchFamily="18" charset="0"/>
+                            </a:rPr>
+                            <m:t>−</m:t>
+                          </m:r>
+                          <m:r>
+                            <a:rPr lang="fr-FR" i="1">
+                              <a:latin typeface="Cambria Math" panose="02040503050406030204" pitchFamily="18" charset="0"/>
+                              <a:ea typeface="Cambria Math" panose="02040503050406030204" pitchFamily="18" charset="0"/>
+                            </a:rPr>
+                            <m:t>∞</m:t>
+                          </m:r>
+                        </m:sub>
+                        <m:sup>
+                          <m:r>
+                            <a:rPr lang="fr-FR" i="1">
+                              <a:latin typeface="Cambria Math" panose="02040503050406030204" pitchFamily="18" charset="0"/>
+                            </a:rPr>
+                            <m:t>+</m:t>
+                          </m:r>
+                          <m:r>
+                            <a:rPr lang="fr-FR" i="1">
+                              <a:latin typeface="Cambria Math" panose="02040503050406030204" pitchFamily="18" charset="0"/>
+                              <a:ea typeface="Cambria Math" panose="02040503050406030204" pitchFamily="18" charset="0"/>
+                            </a:rPr>
+                            <m:t>∞</m:t>
+                          </m:r>
+                        </m:sup>
+                        <m:e>
+                          <m:r>
+                            <a:rPr lang="fr-FR" i="1">
+                              <a:latin typeface="Cambria Math" panose="02040503050406030204" pitchFamily="18" charset="0"/>
+                            </a:rPr>
+                            <m:t>𝑓</m:t>
+                          </m:r>
+                          <m:d>
+                            <m:dPr>
+                              <m:ctrlPr>
+                                <a:rPr lang="fr-FR" i="1">
+                                  <a:latin typeface="Cambria Math" panose="02040503050406030204" pitchFamily="18" charset="0"/>
+                                </a:rPr>
+                              </m:ctrlPr>
+                            </m:dPr>
+                            <m:e>
+                              <m:r>
+                                <a:rPr lang="fr-FR" i="1">
+                                  <a:latin typeface="Cambria Math" panose="02040503050406030204" pitchFamily="18" charset="0"/>
+                                </a:rPr>
+                                <m:t>𝑡</m:t>
+                              </m:r>
+                            </m:e>
+                          </m:d>
+                          <m:r>
+                            <a:rPr lang="fr-FR" i="1">
+                              <a:latin typeface="Cambria Math" panose="02040503050406030204" pitchFamily="18" charset="0"/>
+                              <a:ea typeface="Cambria Math" panose="02040503050406030204" pitchFamily="18" charset="0"/>
+                            </a:rPr>
+                            <m:t>∙</m:t>
+                          </m:r>
+                          <m:f>
+                            <m:fPr>
+                              <m:ctrlPr>
+                                <a:rPr lang="fr-FR" i="1">
+                                  <a:latin typeface="Cambria Math" panose="02040503050406030204" pitchFamily="18" charset="0"/>
+                                </a:rPr>
+                              </m:ctrlPr>
+                            </m:fPr>
+                            <m:num>
+                              <m:r>
+                                <a:rPr lang="fr-FR" i="1">
+                                  <a:latin typeface="Cambria Math" panose="02040503050406030204" pitchFamily="18" charset="0"/>
+                                </a:rPr>
+                                <m:t>1</m:t>
+                              </m:r>
+                            </m:num>
+                            <m:den>
+                              <m:rad>
+                                <m:radPr>
+                                  <m:degHide m:val="on"/>
+                                  <m:ctrlPr>
+                                    <a:rPr lang="fr-FR" i="1">
+                                      <a:latin typeface="Cambria Math" panose="02040503050406030204" pitchFamily="18" charset="0"/>
+                                    </a:rPr>
+                                  </m:ctrlPr>
+                                </m:radPr>
+                                <m:deg/>
+                                <m:e>
+                                  <m:r>
+                                    <a:rPr lang="fr-FR" i="1">
+                                      <a:latin typeface="Cambria Math" panose="02040503050406030204" pitchFamily="18" charset="0"/>
+                                    </a:rPr>
+                                    <m:t>𝑎</m:t>
+                                  </m:r>
+                                </m:e>
+                              </m:rad>
+                            </m:den>
+                          </m:f>
+                          <m:r>
+                            <m:rPr>
+                              <m:sty m:val="p"/>
+                            </m:rPr>
+                            <a:rPr lang="el-GR" i="1">
+                              <a:latin typeface="Cambria Math" panose="02040503050406030204" pitchFamily="18" charset="0"/>
+                              <a:ea typeface="Cambria Math" panose="02040503050406030204" pitchFamily="18" charset="0"/>
+                            </a:rPr>
+                            <m:t>ψ</m:t>
+                          </m:r>
+                          <m:d>
+                            <m:dPr>
+                              <m:ctrlPr>
+                                <a:rPr lang="fr-FR" i="1">
+                                  <a:latin typeface="Cambria Math" panose="02040503050406030204" pitchFamily="18" charset="0"/>
+                                  <a:ea typeface="Cambria Math" panose="02040503050406030204" pitchFamily="18" charset="0"/>
+                                </a:rPr>
+                              </m:ctrlPr>
+                            </m:dPr>
+                            <m:e>
+                              <m:f>
+                                <m:fPr>
+                                  <m:ctrlPr>
+                                    <a:rPr lang="fr-FR" i="1">
+                                      <a:latin typeface="Cambria Math" panose="02040503050406030204" pitchFamily="18" charset="0"/>
+                                      <a:ea typeface="Cambria Math" panose="02040503050406030204" pitchFamily="18" charset="0"/>
+                                    </a:rPr>
+                                  </m:ctrlPr>
+                                </m:fPr>
+                                <m:num>
+                                  <m:r>
+                                    <a:rPr lang="fr-FR" i="1">
+                                      <a:latin typeface="Cambria Math" panose="02040503050406030204" pitchFamily="18" charset="0"/>
+                                      <a:ea typeface="Cambria Math" panose="02040503050406030204" pitchFamily="18" charset="0"/>
+                                    </a:rPr>
+                                    <m:t>𝑡</m:t>
+                                  </m:r>
+                                  <m:r>
+                                    <a:rPr lang="fr-FR" i="1">
+                                      <a:latin typeface="Cambria Math" panose="02040503050406030204" pitchFamily="18" charset="0"/>
+                                      <a:ea typeface="Cambria Math" panose="02040503050406030204" pitchFamily="18" charset="0"/>
+                                    </a:rPr>
+                                    <m:t>−</m:t>
+                                  </m:r>
+                                  <m:r>
+                                    <a:rPr lang="fr-FR" i="1">
+                                      <a:latin typeface="Cambria Math" panose="02040503050406030204" pitchFamily="18" charset="0"/>
+                                      <a:ea typeface="Cambria Math" panose="02040503050406030204" pitchFamily="18" charset="0"/>
+                                    </a:rPr>
+                                    <m:t>𝑏</m:t>
+                                  </m:r>
+                                </m:num>
+                                <m:den>
+                                  <m:r>
+                                    <a:rPr lang="fr-FR" i="1">
+                                      <a:latin typeface="Cambria Math" panose="02040503050406030204" pitchFamily="18" charset="0"/>
+                                      <a:ea typeface="Cambria Math" panose="02040503050406030204" pitchFamily="18" charset="0"/>
+                                    </a:rPr>
+                                    <m:t>𝑎</m:t>
+                                  </m:r>
+                                </m:den>
+                              </m:f>
+                            </m:e>
+                          </m:d>
+                          <m:r>
+                            <a:rPr lang="fr-FR" i="1">
+                              <a:latin typeface="Cambria Math" panose="02040503050406030204" pitchFamily="18" charset="0"/>
+                            </a:rPr>
+                            <m:t>𝑑𝑡</m:t>
+                          </m:r>
+                        </m:e>
+                      </m:nary>
+                    </m:oMath>
+                  </m:oMathPara>
+                </a14:m>
+                <a:endParaRPr lang="fr-FR" dirty="0" smtClean="0"/>
+              </a:p>
+              <a:p>
+                <a:pPr>
+                  <a:buClr>
+                    <a:schemeClr val="tx1">
+                      <a:lumMod val="75000"/>
+                    </a:schemeClr>
+                  </a:buClr>
+                </a:pPr>
+                <a:r>
+                  <a:rPr lang="fr-FR" dirty="0" smtClean="0"/>
+                  <a:t>Particulièrement pertinent pour des signaux non-stationnaires.</a:t>
+                </a:r>
+              </a:p>
+              <a:p>
+                <a:pPr>
+                  <a:buClr>
+                    <a:schemeClr val="tx1">
+                      <a:lumMod val="75000"/>
+                    </a:schemeClr>
+                  </a:buClr>
+                </a:pPr>
+                <a:r>
+                  <a:rPr lang="fr-FR" dirty="0" smtClean="0"/>
+                  <a:t>Il n’y a pas unicité de la décomposition</a:t>
+                </a:r>
+                <a:endParaRPr lang="fr-FR" dirty="0" smtClean="0"/>
+              </a:p>
+              <a:p>
+                <a:pPr marL="0" indent="0">
+                  <a:buClr>
+                    <a:schemeClr val="tx1">
+                      <a:lumMod val="75000"/>
+                    </a:schemeClr>
+                  </a:buClr>
+                  <a:buNone/>
+                </a:pPr>
+                <a:endParaRPr lang="fr-FR" dirty="0" smtClean="0"/>
+              </a:p>
+              <a:p>
+                <a:pPr marL="0" indent="0">
+                  <a:buClr>
+                    <a:schemeClr val="tx1">
+                      <a:lumMod val="75000"/>
+                    </a:schemeClr>
+                  </a:buClr>
+                  <a:buNone/>
+                </a:pPr>
+                <a:endParaRPr lang="fr-FR" dirty="0" smtClean="0"/>
+              </a:p>
+              <a:p>
+                <a:pPr marL="0" indent="0">
+                  <a:buClr>
+                    <a:schemeClr val="tx1">
+                      <a:lumMod val="75000"/>
+                    </a:schemeClr>
+                  </a:buClr>
+                  <a:buNone/>
+                </a:pPr>
+                <a:endParaRPr lang="fr-FR" dirty="0" smtClean="0"/>
+              </a:p>
+            </p:txBody>
+          </p:sp>
+        </mc:Choice>
+        <mc:Fallback>
+          <p:sp>
+            <p:nvSpPr>
+              <p:cNvPr id="3" name="Espace réservé du contenu 2"/>
+              <p:cNvSpPr>
+                <a:spLocks noGrp="1" noRot="1" noChangeAspect="1" noMove="1" noResize="1" noEditPoints="1" noAdjustHandles="1" noChangeArrowheads="1" noChangeShapeType="1" noTextEdit="1"/>
+              </p:cNvSpPr>
+              <p:nvPr>
+                <p:ph idx="1"/>
+              </p:nvPr>
+            </p:nvSpPr>
+            <p:spPr>
+              <a:blipFill rotWithShape="0">
+                <a:blip r:embed="rId2"/>
+                <a:stretch>
+                  <a:fillRect l="-467"/>
+                </a:stretch>
+              </a:blipFill>
+            </p:spPr>
+            <p:txBody>
+              <a:bodyPr/>
+              <a:lstStyle/>
+              <a:p>
+                <a:r>
+                  <a:rPr lang="fr-FR">
+                    <a:noFill/>
+                  </a:rPr>
+                  <a:t> </a:t>
+                </a:r>
+              </a:p>
+            </p:txBody>
+          </p:sp>
+        </mc:Fallback>
+      </mc:AlternateContent>
+    </p:spTree>
+    <p:extLst>
+      <p:ext uri="{BB962C8B-B14F-4D97-AF65-F5344CB8AC3E}">
+        <p14:creationId xmlns:p14="http://schemas.microsoft.com/office/powerpoint/2010/main" val="729063011"/>
+      </p:ext>
+    </p:extLst>
+  </p:cSld>
+  <p:clrMapOvr>
+    <a:masterClrMapping/>
+  </p:clrMapOvr>
+  <mc:AlternateContent xmlns:mc="http://schemas.openxmlformats.org/markup-compatibility/2006" xmlns:p14="http://schemas.microsoft.com/office/powerpoint/2010/main">
+    <mc:Choice Requires="p14">
+      <p:transition spd="med" p14:dur="700">
+        <p:fade/>
+      </p:transition>
+    </mc:Choice>
+    <mc:Fallback xmlns="">
+      <p:transition spd="med">
+        <p:fade/>
+      </p:transition>
+    </mc:Fallback>
+  </mc:AlternateContent>
+  <p:timing>
+    <p:tnLst>
+      <p:par>
+        <p:cTn id="1" dur="indefinite" restart="never" nodeType="tmRoot"/>
+      </p:par>
+    </p:tnLst>
+  </p:timing>
+</p:sld>
+</file>
+
+<file path=ppt/slides/slide14.xml><?xml version="1.0" encoding="utf-8"?>
 <p:sld xmlns:a="http://schemas.openxmlformats.org/drawingml/2006/main" xmlns:r="http://schemas.openxmlformats.org/officeDocument/2006/relationships" xmlns:p="http://schemas.openxmlformats.org/presentationml/2006/main">
   <p:cSld>
     <p:spTree>
@@ -10801,7 +12429,7 @@
 </p:sld>
 </file>
 
-<file path=ppt/slides/slide14.xml><?xml version="1.0" encoding="utf-8"?>
+<file path=ppt/slides/slide15.xml><?xml version="1.0" encoding="utf-8"?>
 <p:sld xmlns:a="http://schemas.openxmlformats.org/drawingml/2006/main" xmlns:r="http://schemas.openxmlformats.org/officeDocument/2006/relationships" xmlns:p="http://schemas.openxmlformats.org/presentationml/2006/main">
   <p:cSld>
     <p:spTree>
@@ -11006,7 +12634,7 @@
 </p:sld>
 </file>
 
-<file path=ppt/slides/slide15.xml><?xml version="1.0" encoding="utf-8"?>
+<file path=ppt/slides/slide16.xml><?xml version="1.0" encoding="utf-8"?>
 <p:sld xmlns:a="http://schemas.openxmlformats.org/drawingml/2006/main" xmlns:r="http://schemas.openxmlformats.org/officeDocument/2006/relationships" xmlns:p="http://schemas.openxmlformats.org/presentationml/2006/main">
   <p:cSld>
     <p:spTree>
@@ -11155,7 +12783,7 @@
 </p:sld>
 </file>
 
-<file path=ppt/slides/slide16.xml><?xml version="1.0" encoding="utf-8"?>
+<file path=ppt/slides/slide17.xml><?xml version="1.0" encoding="utf-8"?>
 <p:sld xmlns:a="http://schemas.openxmlformats.org/drawingml/2006/main" xmlns:r="http://schemas.openxmlformats.org/officeDocument/2006/relationships" xmlns:p="http://schemas.openxmlformats.org/presentationml/2006/main">
   <p:cSld>
     <p:spTree>
@@ -11320,7 +12948,7 @@
 </p:sld>
 </file>
 
-<file path=ppt/slides/slide17.xml><?xml version="1.0" encoding="utf-8"?>
+<file path=ppt/slides/slide18.xml><?xml version="1.0" encoding="utf-8"?>
 <p:sld xmlns:a="http://schemas.openxmlformats.org/drawingml/2006/main" xmlns:r="http://schemas.openxmlformats.org/officeDocument/2006/relationships" xmlns:p="http://schemas.openxmlformats.org/presentationml/2006/main">
   <p:cSld>
     <p:spTree>
@@ -11407,7 +13035,7 @@
 </p:sld>
 </file>
 
-<file path=ppt/slides/slide18.xml><?xml version="1.0" encoding="utf-8"?>
+<file path=ppt/slides/slide19.xml><?xml version="1.0" encoding="utf-8"?>
 <p:sld xmlns:a="http://schemas.openxmlformats.org/drawingml/2006/main" xmlns:r="http://schemas.openxmlformats.org/officeDocument/2006/relationships" xmlns:p="http://schemas.openxmlformats.org/presentationml/2006/main">
   <p:cSld>
     <p:spTree>
@@ -11523,74 +13151,6 @@
     <p:extLst>
       <p:ext uri="{BB962C8B-B14F-4D97-AF65-F5344CB8AC3E}">
         <p14:creationId xmlns:p14="http://schemas.microsoft.com/office/powerpoint/2010/main" val="2637673684"/>
-      </p:ext>
-    </p:extLst>
-  </p:cSld>
-  <p:clrMapOvr>
-    <a:masterClrMapping/>
-  </p:clrMapOvr>
-  <mc:AlternateContent xmlns:mc="http://schemas.openxmlformats.org/markup-compatibility/2006" xmlns:p14="http://schemas.microsoft.com/office/powerpoint/2010/main">
-    <mc:Choice Requires="p14">
-      <p:transition spd="med" p14:dur="700">
-        <p:fade/>
-      </p:transition>
-    </mc:Choice>
-    <mc:Fallback xmlns="">
-      <p:transition spd="med">
-        <p:fade/>
-      </p:transition>
-    </mc:Fallback>
-  </mc:AlternateContent>
-  <p:timing>
-    <p:tnLst>
-      <p:par>
-        <p:cTn id="1" dur="indefinite" restart="never" nodeType="tmRoot"/>
-      </p:par>
-    </p:tnLst>
-  </p:timing>
-</p:sld>
-</file>
-
-<file path=ppt/slides/slide19.xml><?xml version="1.0" encoding="utf-8"?>
-<p:sld xmlns:a="http://schemas.openxmlformats.org/drawingml/2006/main" xmlns:r="http://schemas.openxmlformats.org/officeDocument/2006/relationships" xmlns:p="http://schemas.openxmlformats.org/presentationml/2006/main">
-  <p:cSld>
-    <p:spTree>
-      <p:nvGrpSpPr>
-        <p:cNvPr id="1" name=""/>
-        <p:cNvGrpSpPr/>
-        <p:nvPr/>
-      </p:nvGrpSpPr>
-      <p:grpSpPr>
-        <a:xfrm>
-          <a:off x="0" y="0"/>
-          <a:ext cx="0" cy="0"/>
-          <a:chOff x="0" y="0"/>
-          <a:chExt cx="0" cy="0"/>
-        </a:xfrm>
-      </p:grpSpPr>
-      <p:sp>
-        <p:nvSpPr>
-          <p:cNvPr id="2" name="Titre 1"/>
-          <p:cNvSpPr>
-            <a:spLocks noGrp="1"/>
-          </p:cNvSpPr>
-          <p:nvPr>
-            <p:ph type="title"/>
-          </p:nvPr>
-        </p:nvSpPr>
-        <p:spPr/>
-        <p:txBody>
-          <a:bodyPr/>
-          <a:lstStyle/>
-          <a:p>
-            <a:endParaRPr lang="fr-FR" noProof="1"/>
-          </a:p>
-        </p:txBody>
-      </p:sp>
-    </p:spTree>
-    <p:extLst>
-      <p:ext uri="{BB962C8B-B14F-4D97-AF65-F5344CB8AC3E}">
-        <p14:creationId xmlns:p14="http://schemas.microsoft.com/office/powerpoint/2010/main" val="547100618"/>
       </p:ext>
     </p:extLst>
   </p:cSld>
@@ -11797,6 +13357,74 @@
           <a:chExt cx="0" cy="0"/>
         </a:xfrm>
       </p:grpSpPr>
+      <p:sp>
+        <p:nvSpPr>
+          <p:cNvPr id="2" name="Titre 1"/>
+          <p:cNvSpPr>
+            <a:spLocks noGrp="1"/>
+          </p:cNvSpPr>
+          <p:nvPr>
+            <p:ph type="title"/>
+          </p:nvPr>
+        </p:nvSpPr>
+        <p:spPr/>
+        <p:txBody>
+          <a:bodyPr/>
+          <a:lstStyle/>
+          <a:p>
+            <a:endParaRPr lang="fr-FR" noProof="1"/>
+          </a:p>
+        </p:txBody>
+      </p:sp>
+    </p:spTree>
+    <p:extLst>
+      <p:ext uri="{BB962C8B-B14F-4D97-AF65-F5344CB8AC3E}">
+        <p14:creationId xmlns:p14="http://schemas.microsoft.com/office/powerpoint/2010/main" val="547100618"/>
+      </p:ext>
+    </p:extLst>
+  </p:cSld>
+  <p:clrMapOvr>
+    <a:masterClrMapping/>
+  </p:clrMapOvr>
+  <mc:AlternateContent xmlns:mc="http://schemas.openxmlformats.org/markup-compatibility/2006" xmlns:p14="http://schemas.microsoft.com/office/powerpoint/2010/main">
+    <mc:Choice Requires="p14">
+      <p:transition spd="med" p14:dur="700">
+        <p:fade/>
+      </p:transition>
+    </mc:Choice>
+    <mc:Fallback xmlns="">
+      <p:transition spd="med">
+        <p:fade/>
+      </p:transition>
+    </mc:Fallback>
+  </mc:AlternateContent>
+  <p:timing>
+    <p:tnLst>
+      <p:par>
+        <p:cTn id="1" dur="indefinite" restart="never" nodeType="tmRoot"/>
+      </p:par>
+    </p:tnLst>
+  </p:timing>
+</p:sld>
+</file>
+
+<file path=ppt/slides/slide21.xml><?xml version="1.0" encoding="utf-8"?>
+<p:sld xmlns:a="http://schemas.openxmlformats.org/drawingml/2006/main" xmlns:r="http://schemas.openxmlformats.org/officeDocument/2006/relationships" xmlns:p="http://schemas.openxmlformats.org/presentationml/2006/main">
+  <p:cSld>
+    <p:spTree>
+      <p:nvGrpSpPr>
+        <p:cNvPr id="1" name=""/>
+        <p:cNvGrpSpPr/>
+        <p:nvPr/>
+      </p:nvGrpSpPr>
+      <p:grpSpPr>
+        <a:xfrm>
+          <a:off x="0" y="0"/>
+          <a:ext cx="0" cy="0"/>
+          <a:chOff x="0" y="0"/>
+          <a:chExt cx="0" cy="0"/>
+        </a:xfrm>
+      </p:grpSpPr>
     </p:spTree>
     <p:extLst>
       <p:ext uri="{BB962C8B-B14F-4D97-AF65-F5344CB8AC3E}">
@@ -11829,7 +13457,7 @@
 </p:sld>
 </file>
 
-<file path=ppt/slides/slide21.xml><?xml version="1.0" encoding="utf-8"?>
+<file path=ppt/slides/slide22.xml><?xml version="1.0" encoding="utf-8"?>
 <p:sld xmlns:a="http://schemas.openxmlformats.org/drawingml/2006/main" xmlns:r="http://schemas.openxmlformats.org/officeDocument/2006/relationships" xmlns:p="http://schemas.openxmlformats.org/presentationml/2006/main">
   <p:cSld>
     <p:spTree>
@@ -11935,7 +13563,7 @@
 </p:sld>
 </file>
 
-<file path=ppt/slides/slide22.xml><?xml version="1.0" encoding="utf-8"?>
+<file path=ppt/slides/slide23.xml><?xml version="1.0" encoding="utf-8"?>
 <p:sld xmlns:a="http://schemas.openxmlformats.org/drawingml/2006/main" xmlns:r="http://schemas.openxmlformats.org/officeDocument/2006/relationships" xmlns:p="http://schemas.openxmlformats.org/presentationml/2006/main">
   <p:cSld>
     <p:spTree>
@@ -12427,11 +14055,7 @@
             </a:pPr>
             <a:r>
               <a:rPr lang="fr-FR" dirty="0" smtClean="0"/>
-              <a:t>Les transformées </a:t>
-            </a:r>
-            <a:r>
-              <a:rPr lang="fr-FR" dirty="0" smtClean="0"/>
-              <a:t>de Fourier</a:t>
+              <a:t>Les transformées de Fourier</a:t>
             </a:r>
             <a:endParaRPr lang="fr-FR" dirty="0"/>
           </a:p>
@@ -14562,18 +16186,14 @@
           <a:p>
             <a:r>
               <a:rPr lang="fr-FR" dirty="0" smtClean="0"/>
-              <a:t>Les transformées </a:t>
-            </a:r>
-            <a:r>
-              <a:rPr lang="fr-FR" dirty="0" smtClean="0"/>
-              <a:t>de Fourier</a:t>
+              <a:t>Les transformées de Fourier</a:t>
             </a:r>
             <a:endParaRPr lang="fr-FR" dirty="0"/>
           </a:p>
         </p:txBody>
       </p:sp>
-      <mc:AlternateContent xmlns:mc="http://schemas.openxmlformats.org/markup-compatibility/2006">
-        <mc:Choice xmlns:a14="http://schemas.microsoft.com/office/drawing/2010/main" Requires="a14">
+      <mc:AlternateContent xmlns:mc="http://schemas.openxmlformats.org/markup-compatibility/2006" xmlns:a14="http://schemas.microsoft.com/office/drawing/2010/main">
+        <mc:Choice Requires="a14">
           <p:sp>
             <p:nvSpPr>
               <p:cNvPr id="3" name="Espace réservé du contenu 2"/>
@@ -15175,7 +16795,7 @@
             </p:txBody>
           </p:sp>
         </mc:Choice>
-        <mc:Fallback>
+        <mc:Fallback xmlns="">
           <p:sp>
             <p:nvSpPr>
               <p:cNvPr id="3" name="Espace réservé du contenu 2"/>

</xml_diff>